<commit_message>
Small mods + new slide to use pic in notes.
</commit_message>
<xml_diff>
--- a/slides/GitCollaborativeModels.pptx
+++ b/slides/GitCollaborativeModels.pptx
@@ -5,7 +5,7 @@
     <p:sldMasterId id="2147483648" r:id="rId1"/>
   </p:sldMasterIdLst>
   <p:notesMasterIdLst>
-    <p:notesMasterId r:id="rId19"/>
+    <p:notesMasterId r:id="rId20"/>
   </p:notesMasterIdLst>
   <p:sldIdLst>
     <p:sldId id="260" r:id="rId2"/>
@@ -25,6 +25,7 @@
     <p:sldId id="271" r:id="rId16"/>
     <p:sldId id="270" r:id="rId17"/>
     <p:sldId id="272" r:id="rId18"/>
+    <p:sldId id="273" r:id="rId19"/>
   </p:sldIdLst>
   <p:sldSz cx="12192000" cy="6858000"/>
   <p:notesSz cx="6858000" cy="9144000"/>
@@ -123,6 +124,11 @@
       </a:defRPr>
     </a:lvl9pPr>
   </p:defaultTextStyle>
+  <p:extLst>
+    <p:ext uri="{EFAFB233-063F-42B5-8137-9DF3F51BA10A}">
+      <p15:sldGuideLst xmlns:p15="http://schemas.microsoft.com/office/powerpoint/2012/main"/>
+    </p:ext>
+  </p:extLst>
 </p:presentation>
 </file>
 
@@ -208,7 +214,7 @@
           <a:p>
             <a:fld id="{79847460-FD8C-C64F-ACAC-13C95FE006AF}" type="datetimeFigureOut">
               <a:rPr lang="en-GB" smtClean="0"/>
-              <a:t>24/06/2019</a:t>
+              <a:t>22/08/2019</a:t>
             </a:fld>
             <a:endParaRPr lang="en-GB"/>
           </a:p>
@@ -1408,7 +1414,7 @@
           <a:p>
             <a:fld id="{2CB34A09-5885-994A-9DBC-938228875A28}" type="datetimeFigureOut">
               <a:rPr lang="en-GB" smtClean="0"/>
-              <a:t>24/06/2019</a:t>
+              <a:t>22/08/2019</a:t>
             </a:fld>
             <a:endParaRPr lang="en-GB"/>
           </a:p>
@@ -1608,7 +1614,7 @@
           <a:p>
             <a:fld id="{2CB34A09-5885-994A-9DBC-938228875A28}" type="datetimeFigureOut">
               <a:rPr lang="en-GB" smtClean="0"/>
-              <a:t>24/06/2019</a:t>
+              <a:t>22/08/2019</a:t>
             </a:fld>
             <a:endParaRPr lang="en-GB"/>
           </a:p>
@@ -1818,7 +1824,7 @@
           <a:p>
             <a:fld id="{2CB34A09-5885-994A-9DBC-938228875A28}" type="datetimeFigureOut">
               <a:rPr lang="en-GB" smtClean="0"/>
-              <a:t>24/06/2019</a:t>
+              <a:t>22/08/2019</a:t>
             </a:fld>
             <a:endParaRPr lang="en-GB"/>
           </a:p>
@@ -2018,7 +2024,7 @@
           <a:p>
             <a:fld id="{2CB34A09-5885-994A-9DBC-938228875A28}" type="datetimeFigureOut">
               <a:rPr lang="en-GB" smtClean="0"/>
-              <a:t>24/06/2019</a:t>
+              <a:t>22/08/2019</a:t>
             </a:fld>
             <a:endParaRPr lang="en-GB"/>
           </a:p>
@@ -2294,7 +2300,7 @@
           <a:p>
             <a:fld id="{2CB34A09-5885-994A-9DBC-938228875A28}" type="datetimeFigureOut">
               <a:rPr lang="en-GB" smtClean="0"/>
-              <a:t>24/06/2019</a:t>
+              <a:t>22/08/2019</a:t>
             </a:fld>
             <a:endParaRPr lang="en-GB"/>
           </a:p>
@@ -2562,7 +2568,7 @@
           <a:p>
             <a:fld id="{2CB34A09-5885-994A-9DBC-938228875A28}" type="datetimeFigureOut">
               <a:rPr lang="en-GB" smtClean="0"/>
-              <a:t>24/06/2019</a:t>
+              <a:t>22/08/2019</a:t>
             </a:fld>
             <a:endParaRPr lang="en-GB"/>
           </a:p>
@@ -2977,7 +2983,7 @@
           <a:p>
             <a:fld id="{2CB34A09-5885-994A-9DBC-938228875A28}" type="datetimeFigureOut">
               <a:rPr lang="en-GB" smtClean="0"/>
-              <a:t>24/06/2019</a:t>
+              <a:t>22/08/2019</a:t>
             </a:fld>
             <a:endParaRPr lang="en-GB"/>
           </a:p>
@@ -3119,7 +3125,7 @@
           <a:p>
             <a:fld id="{2CB34A09-5885-994A-9DBC-938228875A28}" type="datetimeFigureOut">
               <a:rPr lang="en-GB" smtClean="0"/>
-              <a:t>24/06/2019</a:t>
+              <a:t>22/08/2019</a:t>
             </a:fld>
             <a:endParaRPr lang="en-GB"/>
           </a:p>
@@ -3232,7 +3238,7 @@
           <a:p>
             <a:fld id="{2CB34A09-5885-994A-9DBC-938228875A28}" type="datetimeFigureOut">
               <a:rPr lang="en-GB" smtClean="0"/>
-              <a:t>24/06/2019</a:t>
+              <a:t>22/08/2019</a:t>
             </a:fld>
             <a:endParaRPr lang="en-GB"/>
           </a:p>
@@ -3545,7 +3551,7 @@
           <a:p>
             <a:fld id="{2CB34A09-5885-994A-9DBC-938228875A28}" type="datetimeFigureOut">
               <a:rPr lang="en-GB" smtClean="0"/>
-              <a:t>24/06/2019</a:t>
+              <a:t>22/08/2019</a:t>
             </a:fld>
             <a:endParaRPr lang="en-GB"/>
           </a:p>
@@ -3834,7 +3840,7 @@
           <a:p>
             <a:fld id="{2CB34A09-5885-994A-9DBC-938228875A28}" type="datetimeFigureOut">
               <a:rPr lang="en-GB" smtClean="0"/>
-              <a:t>24/06/2019</a:t>
+              <a:t>22/08/2019</a:t>
             </a:fld>
             <a:endParaRPr lang="en-GB"/>
           </a:p>
@@ -4077,7 +4083,7 @@
           <a:p>
             <a:fld id="{2CB34A09-5885-994A-9DBC-938228875A28}" type="datetimeFigureOut">
               <a:rPr lang="en-GB" smtClean="0"/>
-              <a:t>24/06/2019</a:t>
+              <a:t>22/08/2019</a:t>
             </a:fld>
             <a:endParaRPr lang="en-GB"/>
           </a:p>
@@ -8189,12 +8195,11 @@
           </p:cNvPr>
           <p:cNvCxnSpPr>
             <a:cxnSpLocks/>
-            <a:endCxn id="30" idx="1"/>
           </p:cNvCxnSpPr>
           <p:nvPr/>
         </p:nvCxnSpPr>
         <p:spPr>
-          <a:xfrm>
+          <a:xfrm flipH="1">
             <a:off x="5521983" y="2513386"/>
             <a:ext cx="1559604" cy="1764"/>
           </a:xfrm>
@@ -12557,13 +12562,11 @@
           </p:cNvPr>
           <p:cNvCxnSpPr>
             <a:cxnSpLocks/>
-            <a:stCxn id="30" idx="1"/>
-            <a:endCxn id="10" idx="3"/>
           </p:cNvCxnSpPr>
           <p:nvPr/>
         </p:nvCxnSpPr>
         <p:spPr>
-          <a:xfrm rot="10800000" flipV="1">
+          <a:xfrm rot="10800000" flipH="1" flipV="1">
             <a:off x="5521983" y="2413554"/>
             <a:ext cx="1587312" cy="136776"/>
           </a:xfrm>
@@ -12633,6 +12636,1122 @@
     <p:extLst>
       <p:ext uri="{BB962C8B-B14F-4D97-AF65-F5344CB8AC3E}">
         <p14:creationId xmlns:p14="http://schemas.microsoft.com/office/powerpoint/2010/main" val="711419498"/>
+      </p:ext>
+    </p:extLst>
+  </p:cSld>
+  <p:clrMapOvr>
+    <a:masterClrMapping/>
+  </p:clrMapOvr>
+</p:sld>
+</file>
+
+<file path=ppt/slides/slide18.xml><?xml version="1.0" encoding="utf-8"?>
+<p:sld xmlns:a="http://schemas.openxmlformats.org/drawingml/2006/main" xmlns:r="http://schemas.openxmlformats.org/officeDocument/2006/relationships" xmlns:p="http://schemas.openxmlformats.org/presentationml/2006/main">
+  <p:cSld>
+    <p:spTree>
+      <p:nvGrpSpPr>
+        <p:cNvPr id="1" name=""/>
+        <p:cNvGrpSpPr/>
+        <p:nvPr/>
+      </p:nvGrpSpPr>
+      <p:grpSpPr>
+        <a:xfrm>
+          <a:off x="0" y="0"/>
+          <a:ext cx="0" cy="0"/>
+          <a:chOff x="0" y="0"/>
+          <a:chExt cx="0" cy="0"/>
+        </a:xfrm>
+      </p:grpSpPr>
+      <p:grpSp>
+        <p:nvGrpSpPr>
+          <p:cNvPr id="50" name="Group 49">
+            <a:extLst>
+              <a:ext uri="{FF2B5EF4-FFF2-40B4-BE49-F238E27FC236}">
+                <a16:creationId xmlns:a16="http://schemas.microsoft.com/office/drawing/2014/main" id="{85375E4E-96A0-DD4D-8C32-FF851703994F}"/>
+              </a:ext>
+            </a:extLst>
+          </p:cNvPr>
+          <p:cNvGrpSpPr/>
+          <p:nvPr/>
+        </p:nvGrpSpPr>
+        <p:grpSpPr>
+          <a:xfrm>
+            <a:off x="600075" y="327403"/>
+            <a:ext cx="9979034" cy="6508211"/>
+            <a:chOff x="600075" y="327403"/>
+            <a:chExt cx="9979034" cy="6508211"/>
+          </a:xfrm>
+        </p:grpSpPr>
+        <p:grpSp>
+          <p:nvGrpSpPr>
+            <p:cNvPr id="3" name="Group 2">
+              <a:extLst>
+                <a:ext uri="{FF2B5EF4-FFF2-40B4-BE49-F238E27FC236}">
+                  <a16:creationId xmlns:a16="http://schemas.microsoft.com/office/drawing/2014/main" id="{C5E32C1B-610E-C74E-AB1D-F36B3CE0ADF6}"/>
+                </a:ext>
+              </a:extLst>
+            </p:cNvPr>
+            <p:cNvGrpSpPr/>
+            <p:nvPr/>
+          </p:nvGrpSpPr>
+          <p:grpSpPr>
+            <a:xfrm>
+              <a:off x="2493033" y="629963"/>
+              <a:ext cx="3028950" cy="2571750"/>
+              <a:chOff x="2493033" y="1218275"/>
+              <a:chExt cx="3028950" cy="2571750"/>
+            </a:xfrm>
+          </p:grpSpPr>
+          <p:sp>
+            <p:nvSpPr>
+              <p:cNvPr id="4" name="Rectangle 3">
+                <a:extLst>
+                  <a:ext uri="{FF2B5EF4-FFF2-40B4-BE49-F238E27FC236}">
+                    <a16:creationId xmlns:a16="http://schemas.microsoft.com/office/drawing/2014/main" id="{9AAFD2ED-DE35-504F-A218-DD8067E5E91F}"/>
+                  </a:ext>
+                </a:extLst>
+              </p:cNvPr>
+              <p:cNvSpPr/>
+              <p:nvPr/>
+            </p:nvSpPr>
+            <p:spPr>
+              <a:xfrm>
+                <a:off x="2493033" y="1218275"/>
+                <a:ext cx="3028950" cy="2571750"/>
+              </a:xfrm>
+              <a:prstGeom prst="rect">
+                <a:avLst/>
+              </a:prstGeom>
+              <a:noFill/>
+              <a:ln>
+                <a:prstDash val="lgDash"/>
+              </a:ln>
+            </p:spPr>
+            <p:style>
+              <a:lnRef idx="2">
+                <a:schemeClr val="accent1">
+                  <a:shade val="50000"/>
+                </a:schemeClr>
+              </a:lnRef>
+              <a:fillRef idx="1">
+                <a:schemeClr val="accent1"/>
+              </a:fillRef>
+              <a:effectRef idx="0">
+                <a:schemeClr val="accent1"/>
+              </a:effectRef>
+              <a:fontRef idx="minor">
+                <a:schemeClr val="lt1"/>
+              </a:fontRef>
+            </p:style>
+            <p:txBody>
+              <a:bodyPr rtlCol="0" anchor="ctr"/>
+              <a:lstStyle/>
+              <a:p>
+                <a:pPr algn="ctr"/>
+                <a:endParaRPr lang="en-GB"/>
+              </a:p>
+            </p:txBody>
+          </p:sp>
+          <p:sp>
+            <p:nvSpPr>
+              <p:cNvPr id="5" name="Rounded Rectangle 4">
+                <a:extLst>
+                  <a:ext uri="{FF2B5EF4-FFF2-40B4-BE49-F238E27FC236}">
+                    <a16:creationId xmlns:a16="http://schemas.microsoft.com/office/drawing/2014/main" id="{BEBC37E2-95BD-5949-B1B5-6717F91E5ABB}"/>
+                  </a:ext>
+                </a:extLst>
+              </p:cNvPr>
+              <p:cNvSpPr/>
+              <p:nvPr/>
+            </p:nvSpPr>
+            <p:spPr>
+              <a:xfrm>
+                <a:off x="2839246" y="2177724"/>
+                <a:ext cx="914400" cy="626663"/>
+              </a:xfrm>
+              <a:prstGeom prst="roundRect">
+                <a:avLst/>
+              </a:prstGeom>
+              <a:solidFill>
+                <a:srgbClr val="FF0000"/>
+              </a:solidFill>
+            </p:spPr>
+            <p:style>
+              <a:lnRef idx="2">
+                <a:schemeClr val="accent1">
+                  <a:shade val="50000"/>
+                </a:schemeClr>
+              </a:lnRef>
+              <a:fillRef idx="1">
+                <a:schemeClr val="accent1"/>
+              </a:fillRef>
+              <a:effectRef idx="0">
+                <a:schemeClr val="accent1"/>
+              </a:effectRef>
+              <a:fontRef idx="minor">
+                <a:schemeClr val="lt1"/>
+              </a:fontRef>
+            </p:style>
+            <p:txBody>
+              <a:bodyPr rtlCol="0" anchor="ctr"/>
+              <a:lstStyle/>
+              <a:p>
+                <a:pPr algn="ctr"/>
+                <a:r>
+                  <a:rPr lang="en-GB" dirty="0"/>
+                  <a:t>Git Repo</a:t>
+                </a:r>
+              </a:p>
+            </p:txBody>
+          </p:sp>
+        </p:grpSp>
+        <p:grpSp>
+          <p:nvGrpSpPr>
+            <p:cNvPr id="8" name="Group 7">
+              <a:extLst>
+                <a:ext uri="{FF2B5EF4-FFF2-40B4-BE49-F238E27FC236}">
+                  <a16:creationId xmlns:a16="http://schemas.microsoft.com/office/drawing/2014/main" id="{264F3919-3EDF-BE42-8980-3439D3B3348D}"/>
+                </a:ext>
+              </a:extLst>
+            </p:cNvPr>
+            <p:cNvGrpSpPr/>
+            <p:nvPr/>
+          </p:nvGrpSpPr>
+          <p:grpSpPr>
+            <a:xfrm>
+              <a:off x="6900951" y="616867"/>
+              <a:ext cx="3028950" cy="2571750"/>
+              <a:chOff x="7109295" y="1127679"/>
+              <a:chExt cx="3028950" cy="2571750"/>
+            </a:xfrm>
+          </p:grpSpPr>
+          <p:sp>
+            <p:nvSpPr>
+              <p:cNvPr id="6" name="Rectangle 5">
+                <a:extLst>
+                  <a:ext uri="{FF2B5EF4-FFF2-40B4-BE49-F238E27FC236}">
+                    <a16:creationId xmlns:a16="http://schemas.microsoft.com/office/drawing/2014/main" id="{951DC552-D816-8245-80D8-D0637753EFCC}"/>
+                  </a:ext>
+                </a:extLst>
+              </p:cNvPr>
+              <p:cNvSpPr/>
+              <p:nvPr/>
+            </p:nvSpPr>
+            <p:spPr>
+              <a:xfrm>
+                <a:off x="7109295" y="1127679"/>
+                <a:ext cx="3028950" cy="2571750"/>
+              </a:xfrm>
+              <a:prstGeom prst="rect">
+                <a:avLst/>
+              </a:prstGeom>
+              <a:noFill/>
+              <a:ln>
+                <a:prstDash val="lgDash"/>
+              </a:ln>
+            </p:spPr>
+            <p:style>
+              <a:lnRef idx="2">
+                <a:schemeClr val="accent1">
+                  <a:shade val="50000"/>
+                </a:schemeClr>
+              </a:lnRef>
+              <a:fillRef idx="1">
+                <a:schemeClr val="accent1"/>
+              </a:fillRef>
+              <a:effectRef idx="0">
+                <a:schemeClr val="accent1"/>
+              </a:effectRef>
+              <a:fontRef idx="minor">
+                <a:schemeClr val="lt1"/>
+              </a:fontRef>
+            </p:style>
+            <p:txBody>
+              <a:bodyPr rtlCol="0" anchor="ctr"/>
+              <a:lstStyle/>
+              <a:p>
+                <a:pPr algn="ctr"/>
+                <a:endParaRPr lang="en-GB"/>
+              </a:p>
+            </p:txBody>
+          </p:sp>
+          <p:sp>
+            <p:nvSpPr>
+              <p:cNvPr id="7" name="Rounded Rectangle 6">
+                <a:extLst>
+                  <a:ext uri="{FF2B5EF4-FFF2-40B4-BE49-F238E27FC236}">
+                    <a16:creationId xmlns:a16="http://schemas.microsoft.com/office/drawing/2014/main" id="{7F407F7F-8AE2-4C42-9A2B-5EBF40177DBD}"/>
+                  </a:ext>
+                </a:extLst>
+              </p:cNvPr>
+              <p:cNvSpPr/>
+              <p:nvPr/>
+            </p:nvSpPr>
+            <p:spPr>
+              <a:xfrm>
+                <a:off x="7981700" y="2100222"/>
+                <a:ext cx="914400" cy="626663"/>
+              </a:xfrm>
+              <a:prstGeom prst="roundRect">
+                <a:avLst/>
+              </a:prstGeom>
+              <a:solidFill>
+                <a:srgbClr val="00B050"/>
+              </a:solidFill>
+            </p:spPr>
+            <p:style>
+              <a:lnRef idx="2">
+                <a:schemeClr val="accent1">
+                  <a:shade val="50000"/>
+                </a:schemeClr>
+              </a:lnRef>
+              <a:fillRef idx="1">
+                <a:schemeClr val="accent1"/>
+              </a:fillRef>
+              <a:effectRef idx="0">
+                <a:schemeClr val="accent1"/>
+              </a:effectRef>
+              <a:fontRef idx="minor">
+                <a:schemeClr val="lt1"/>
+              </a:fontRef>
+            </p:style>
+            <p:txBody>
+              <a:bodyPr rtlCol="0" anchor="ctr"/>
+              <a:lstStyle/>
+              <a:p>
+                <a:pPr algn="ctr"/>
+                <a:r>
+                  <a:rPr lang="en-GB" dirty="0"/>
+                  <a:t>Git Repo</a:t>
+                </a:r>
+              </a:p>
+            </p:txBody>
+          </p:sp>
+        </p:grpSp>
+        <p:sp>
+          <p:nvSpPr>
+            <p:cNvPr id="14" name="Rounded Rectangle 13">
+              <a:extLst>
+                <a:ext uri="{FF2B5EF4-FFF2-40B4-BE49-F238E27FC236}">
+                  <a16:creationId xmlns:a16="http://schemas.microsoft.com/office/drawing/2014/main" id="{BC01A2CE-04EA-4A41-95BA-CD72B5443E98}"/>
+                </a:ext>
+              </a:extLst>
+            </p:cNvPr>
+            <p:cNvSpPr/>
+            <p:nvPr/>
+          </p:nvSpPr>
+          <p:spPr>
+            <a:xfrm>
+              <a:off x="4180614" y="1589411"/>
+              <a:ext cx="914400" cy="626663"/>
+            </a:xfrm>
+            <a:prstGeom prst="roundRect">
+              <a:avLst/>
+            </a:prstGeom>
+            <a:solidFill>
+              <a:srgbClr val="00B050"/>
+            </a:solidFill>
+          </p:spPr>
+          <p:style>
+            <a:lnRef idx="2">
+              <a:schemeClr val="accent1">
+                <a:shade val="50000"/>
+              </a:schemeClr>
+            </a:lnRef>
+            <a:fillRef idx="1">
+              <a:schemeClr val="accent1"/>
+            </a:fillRef>
+            <a:effectRef idx="0">
+              <a:schemeClr val="accent1"/>
+            </a:effectRef>
+            <a:fontRef idx="minor">
+              <a:schemeClr val="lt1"/>
+            </a:fontRef>
+          </p:style>
+          <p:txBody>
+            <a:bodyPr rtlCol="0" anchor="ctr"/>
+            <a:lstStyle/>
+            <a:p>
+              <a:pPr algn="ctr"/>
+              <a:r>
+                <a:rPr lang="en-GB" dirty="0"/>
+                <a:t>Git Repo</a:t>
+              </a:r>
+            </a:p>
+          </p:txBody>
+        </p:sp>
+        <p:pic>
+          <p:nvPicPr>
+            <p:cNvPr id="16" name="Picture 15">
+              <a:extLst>
+                <a:ext uri="{FF2B5EF4-FFF2-40B4-BE49-F238E27FC236}">
+                  <a16:creationId xmlns:a16="http://schemas.microsoft.com/office/drawing/2014/main" id="{87B1F67C-8B6B-4947-9736-E23954A1F28B}"/>
+                </a:ext>
+              </a:extLst>
+            </p:cNvPr>
+            <p:cNvPicPr>
+              <a:picLocks noChangeAspect="1"/>
+            </p:cNvPicPr>
+            <p:nvPr/>
+          </p:nvPicPr>
+          <p:blipFill>
+            <a:blip r:embed="rId2"/>
+            <a:stretch>
+              <a:fillRect/>
+            </a:stretch>
+          </p:blipFill>
+          <p:spPr>
+            <a:xfrm>
+              <a:off x="834575" y="4792079"/>
+              <a:ext cx="998372" cy="1080000"/>
+            </a:xfrm>
+            <a:prstGeom prst="rect">
+              <a:avLst/>
+            </a:prstGeom>
+          </p:spPr>
+        </p:pic>
+        <p:sp>
+          <p:nvSpPr>
+            <p:cNvPr id="18" name="Rectangle 17">
+              <a:extLst>
+                <a:ext uri="{FF2B5EF4-FFF2-40B4-BE49-F238E27FC236}">
+                  <a16:creationId xmlns:a16="http://schemas.microsoft.com/office/drawing/2014/main" id="{4938C13F-9874-C94D-9442-7031189DA2E9}"/>
+                </a:ext>
+              </a:extLst>
+            </p:cNvPr>
+            <p:cNvSpPr/>
+            <p:nvPr/>
+          </p:nvSpPr>
+          <p:spPr>
+            <a:xfrm>
+              <a:off x="600075" y="3886200"/>
+              <a:ext cx="4793728" cy="2571750"/>
+            </a:xfrm>
+            <a:prstGeom prst="rect">
+              <a:avLst/>
+            </a:prstGeom>
+            <a:noFill/>
+            <a:ln>
+              <a:prstDash val="lgDash"/>
+            </a:ln>
+          </p:spPr>
+          <p:style>
+            <a:lnRef idx="2">
+              <a:schemeClr val="accent1">
+                <a:shade val="50000"/>
+              </a:schemeClr>
+            </a:lnRef>
+            <a:fillRef idx="1">
+              <a:schemeClr val="accent1"/>
+            </a:fillRef>
+            <a:effectRef idx="0">
+              <a:schemeClr val="accent1"/>
+            </a:effectRef>
+            <a:fontRef idx="minor">
+              <a:schemeClr val="lt1"/>
+            </a:fontRef>
+          </p:style>
+          <p:txBody>
+            <a:bodyPr rtlCol="0" anchor="ctr"/>
+            <a:lstStyle/>
+            <a:p>
+              <a:pPr algn="ctr"/>
+              <a:endParaRPr lang="en-GB"/>
+            </a:p>
+          </p:txBody>
+        </p:sp>
+        <p:sp>
+          <p:nvSpPr>
+            <p:cNvPr id="22" name="Rounded Rectangle 21">
+              <a:extLst>
+                <a:ext uri="{FF2B5EF4-FFF2-40B4-BE49-F238E27FC236}">
+                  <a16:creationId xmlns:a16="http://schemas.microsoft.com/office/drawing/2014/main" id="{13281585-0573-C44C-835E-0AFAAC4F1A40}"/>
+                </a:ext>
+              </a:extLst>
+            </p:cNvPr>
+            <p:cNvSpPr/>
+            <p:nvPr/>
+          </p:nvSpPr>
+          <p:spPr>
+            <a:xfrm>
+              <a:off x="3723414" y="4932031"/>
+              <a:ext cx="914400" cy="626663"/>
+            </a:xfrm>
+            <a:prstGeom prst="roundRect">
+              <a:avLst/>
+            </a:prstGeom>
+            <a:solidFill>
+              <a:srgbClr val="00B050"/>
+            </a:solidFill>
+          </p:spPr>
+          <p:style>
+            <a:lnRef idx="2">
+              <a:schemeClr val="accent1">
+                <a:shade val="50000"/>
+              </a:schemeClr>
+            </a:lnRef>
+            <a:fillRef idx="1">
+              <a:schemeClr val="accent1"/>
+            </a:fillRef>
+            <a:effectRef idx="0">
+              <a:schemeClr val="accent1"/>
+            </a:effectRef>
+            <a:fontRef idx="minor">
+              <a:schemeClr val="lt1"/>
+            </a:fontRef>
+          </p:style>
+          <p:txBody>
+            <a:bodyPr rtlCol="0" anchor="ctr"/>
+            <a:lstStyle/>
+            <a:p>
+              <a:pPr algn="ctr"/>
+              <a:r>
+                <a:rPr lang="en-GB" dirty="0"/>
+                <a:t>Git Repo</a:t>
+              </a:r>
+            </a:p>
+          </p:txBody>
+        </p:sp>
+        <p:cxnSp>
+          <p:nvCxnSpPr>
+            <p:cNvPr id="23" name="Elbow Connector 22">
+              <a:extLst>
+                <a:ext uri="{FF2B5EF4-FFF2-40B4-BE49-F238E27FC236}">
+                  <a16:creationId xmlns:a16="http://schemas.microsoft.com/office/drawing/2014/main" id="{36915D43-6F01-5B4F-A0B8-8F8895721E49}"/>
+                </a:ext>
+              </a:extLst>
+            </p:cNvPr>
+            <p:cNvCxnSpPr>
+              <a:cxnSpLocks/>
+            </p:cNvCxnSpPr>
+            <p:nvPr/>
+          </p:nvCxnSpPr>
+          <p:spPr>
+            <a:xfrm rot="10800000" flipV="1">
+              <a:off x="5095014" y="1902741"/>
+              <a:ext cx="2678342" cy="1"/>
+            </a:xfrm>
+            <a:prstGeom prst="bentConnector3">
+              <a:avLst>
+                <a:gd name="adj1" fmla="val 50000"/>
+              </a:avLst>
+            </a:prstGeom>
+            <a:ln w="76200">
+              <a:solidFill>
+                <a:srgbClr val="FF0000"/>
+              </a:solidFill>
+              <a:tailEnd type="triangle"/>
+            </a:ln>
+          </p:spPr>
+          <p:style>
+            <a:lnRef idx="1">
+              <a:schemeClr val="accent1"/>
+            </a:lnRef>
+            <a:fillRef idx="0">
+              <a:schemeClr val="accent1"/>
+            </a:fillRef>
+            <a:effectRef idx="0">
+              <a:schemeClr val="accent1"/>
+            </a:effectRef>
+            <a:fontRef idx="minor">
+              <a:schemeClr val="tx1"/>
+            </a:fontRef>
+          </p:style>
+        </p:cxnSp>
+        <p:sp>
+          <p:nvSpPr>
+            <p:cNvPr id="24" name="TextBox 23">
+              <a:extLst>
+                <a:ext uri="{FF2B5EF4-FFF2-40B4-BE49-F238E27FC236}">
+                  <a16:creationId xmlns:a16="http://schemas.microsoft.com/office/drawing/2014/main" id="{7CECE6BB-3BE6-194A-9371-7DD1730FFDAE}"/>
+                </a:ext>
+              </a:extLst>
+            </p:cNvPr>
+            <p:cNvSpPr txBox="1"/>
+            <p:nvPr/>
+          </p:nvSpPr>
+          <p:spPr>
+            <a:xfrm>
+              <a:off x="7773356" y="3462222"/>
+              <a:ext cx="2805753" cy="369332"/>
+            </a:xfrm>
+            <a:prstGeom prst="rect">
+              <a:avLst/>
+            </a:prstGeom>
+            <a:noFill/>
+          </p:spPr>
+          <p:txBody>
+            <a:bodyPr wrap="square" rtlCol="0">
+              <a:spAutoFit/>
+            </a:bodyPr>
+            <a:lstStyle/>
+            <a:p>
+              <a:r>
+                <a:rPr lang="en-GB" i="1" dirty="0"/>
+                <a:t>External Git Service Provider</a:t>
+              </a:r>
+            </a:p>
+          </p:txBody>
+        </p:sp>
+        <p:sp>
+          <p:nvSpPr>
+            <p:cNvPr id="27" name="TextBox 26">
+              <a:extLst>
+                <a:ext uri="{FF2B5EF4-FFF2-40B4-BE49-F238E27FC236}">
+                  <a16:creationId xmlns:a16="http://schemas.microsoft.com/office/drawing/2014/main" id="{3F382545-97DB-4D46-A3BE-B4D7CEBB0DF9}"/>
+                </a:ext>
+              </a:extLst>
+            </p:cNvPr>
+            <p:cNvSpPr txBox="1"/>
+            <p:nvPr/>
+          </p:nvSpPr>
+          <p:spPr>
+            <a:xfrm>
+              <a:off x="3063123" y="1289818"/>
+              <a:ext cx="427440" cy="369332"/>
+            </a:xfrm>
+            <a:prstGeom prst="rect">
+              <a:avLst/>
+            </a:prstGeom>
+            <a:noFill/>
+          </p:spPr>
+          <p:txBody>
+            <a:bodyPr wrap="square" rtlCol="0">
+              <a:spAutoFit/>
+            </a:bodyPr>
+            <a:lstStyle/>
+            <a:p>
+              <a:r>
+                <a:rPr lang="en-GB" i="1" dirty="0"/>
+                <a:t>R1</a:t>
+              </a:r>
+            </a:p>
+          </p:txBody>
+        </p:sp>
+        <p:sp>
+          <p:nvSpPr>
+            <p:cNvPr id="29" name="TextBox 28">
+              <a:extLst>
+                <a:ext uri="{FF2B5EF4-FFF2-40B4-BE49-F238E27FC236}">
+                  <a16:creationId xmlns:a16="http://schemas.microsoft.com/office/drawing/2014/main" id="{DFFCD99B-D7FE-7A47-B089-C5BD3BC579A1}"/>
+                </a:ext>
+              </a:extLst>
+            </p:cNvPr>
+            <p:cNvSpPr txBox="1"/>
+            <p:nvPr/>
+          </p:nvSpPr>
+          <p:spPr>
+            <a:xfrm>
+              <a:off x="4442091" y="1252580"/>
+              <a:ext cx="427440" cy="369332"/>
+            </a:xfrm>
+            <a:prstGeom prst="rect">
+              <a:avLst/>
+            </a:prstGeom>
+            <a:noFill/>
+          </p:spPr>
+          <p:txBody>
+            <a:bodyPr wrap="square" rtlCol="0">
+              <a:spAutoFit/>
+            </a:bodyPr>
+            <a:lstStyle/>
+            <a:p>
+              <a:r>
+                <a:rPr lang="en-GB" i="1" dirty="0"/>
+                <a:t>R3</a:t>
+              </a:r>
+            </a:p>
+          </p:txBody>
+        </p:sp>
+        <p:sp>
+          <p:nvSpPr>
+            <p:cNvPr id="30" name="TextBox 29">
+              <a:extLst>
+                <a:ext uri="{FF2B5EF4-FFF2-40B4-BE49-F238E27FC236}">
+                  <a16:creationId xmlns:a16="http://schemas.microsoft.com/office/drawing/2014/main" id="{DCC3A6B8-69C4-9546-ACC1-71EBA60DF0F1}"/>
+                </a:ext>
+              </a:extLst>
+            </p:cNvPr>
+            <p:cNvSpPr txBox="1"/>
+            <p:nvPr/>
+          </p:nvSpPr>
+          <p:spPr>
+            <a:xfrm>
+              <a:off x="3927441" y="5661765"/>
+              <a:ext cx="427440" cy="369332"/>
+            </a:xfrm>
+            <a:prstGeom prst="rect">
+              <a:avLst/>
+            </a:prstGeom>
+            <a:noFill/>
+          </p:spPr>
+          <p:txBody>
+            <a:bodyPr wrap="square" rtlCol="0">
+              <a:spAutoFit/>
+            </a:bodyPr>
+            <a:lstStyle/>
+            <a:p>
+              <a:r>
+                <a:rPr lang="en-GB" i="1" dirty="0"/>
+                <a:t>R4</a:t>
+              </a:r>
+            </a:p>
+          </p:txBody>
+        </p:sp>
+        <p:sp>
+          <p:nvSpPr>
+            <p:cNvPr id="31" name="TextBox 30">
+              <a:extLst>
+                <a:ext uri="{FF2B5EF4-FFF2-40B4-BE49-F238E27FC236}">
+                  <a16:creationId xmlns:a16="http://schemas.microsoft.com/office/drawing/2014/main" id="{CE2045C1-77BB-A748-8C5F-EAB90F771773}"/>
+                </a:ext>
+              </a:extLst>
+            </p:cNvPr>
+            <p:cNvSpPr txBox="1"/>
+            <p:nvPr/>
+          </p:nvSpPr>
+          <p:spPr>
+            <a:xfrm>
+              <a:off x="7987986" y="1220078"/>
+              <a:ext cx="427440" cy="369332"/>
+            </a:xfrm>
+            <a:prstGeom prst="rect">
+              <a:avLst/>
+            </a:prstGeom>
+            <a:noFill/>
+          </p:spPr>
+          <p:txBody>
+            <a:bodyPr wrap="square" rtlCol="0">
+              <a:spAutoFit/>
+            </a:bodyPr>
+            <a:lstStyle/>
+            <a:p>
+              <a:r>
+                <a:rPr lang="en-GB" i="1" dirty="0"/>
+                <a:t>R2</a:t>
+              </a:r>
+            </a:p>
+          </p:txBody>
+        </p:sp>
+        <p:cxnSp>
+          <p:nvCxnSpPr>
+            <p:cNvPr id="32" name="Elbow Connector 31">
+              <a:extLst>
+                <a:ext uri="{FF2B5EF4-FFF2-40B4-BE49-F238E27FC236}">
+                  <a16:creationId xmlns:a16="http://schemas.microsoft.com/office/drawing/2014/main" id="{F6219123-7605-7545-B6B8-8EE575412933}"/>
+                </a:ext>
+              </a:extLst>
+            </p:cNvPr>
+            <p:cNvCxnSpPr>
+              <a:cxnSpLocks/>
+              <a:stCxn id="14" idx="2"/>
+              <a:endCxn id="22" idx="0"/>
+            </p:cNvCxnSpPr>
+            <p:nvPr/>
+          </p:nvCxnSpPr>
+          <p:spPr>
+            <a:xfrm rot="5400000">
+              <a:off x="3051236" y="3345452"/>
+              <a:ext cx="2715957" cy="457200"/>
+            </a:xfrm>
+            <a:prstGeom prst="bentConnector3">
+              <a:avLst>
+                <a:gd name="adj1" fmla="val 50000"/>
+              </a:avLst>
+            </a:prstGeom>
+            <a:ln w="76200">
+              <a:solidFill>
+                <a:srgbClr val="FF0000"/>
+              </a:solidFill>
+              <a:tailEnd type="triangle"/>
+            </a:ln>
+          </p:spPr>
+          <p:style>
+            <a:lnRef idx="1">
+              <a:schemeClr val="accent1"/>
+            </a:lnRef>
+            <a:fillRef idx="0">
+              <a:schemeClr val="accent1"/>
+            </a:fillRef>
+            <a:effectRef idx="0">
+              <a:schemeClr val="accent1"/>
+            </a:effectRef>
+            <a:fontRef idx="minor">
+              <a:schemeClr val="tx1"/>
+            </a:fontRef>
+          </p:style>
+        </p:cxnSp>
+        <p:sp>
+          <p:nvSpPr>
+            <p:cNvPr id="36" name="TextBox 35">
+              <a:extLst>
+                <a:ext uri="{FF2B5EF4-FFF2-40B4-BE49-F238E27FC236}">
+                  <a16:creationId xmlns:a16="http://schemas.microsoft.com/office/drawing/2014/main" id="{D24F4AD1-5E45-C647-926C-04A835A10CCB}"/>
+                </a:ext>
+              </a:extLst>
+            </p:cNvPr>
+            <p:cNvSpPr txBox="1"/>
+            <p:nvPr/>
+          </p:nvSpPr>
+          <p:spPr>
+            <a:xfrm>
+              <a:off x="6097109" y="1589646"/>
+              <a:ext cx="588366" cy="369332"/>
+            </a:xfrm>
+            <a:prstGeom prst="rect">
+              <a:avLst/>
+            </a:prstGeom>
+            <a:noFill/>
+          </p:spPr>
+          <p:txBody>
+            <a:bodyPr wrap="square" rtlCol="0">
+              <a:spAutoFit/>
+            </a:bodyPr>
+            <a:lstStyle/>
+            <a:p>
+              <a:r>
+                <a:rPr lang="en-GB" i="1" dirty="0"/>
+                <a:t>Fork</a:t>
+              </a:r>
+            </a:p>
+          </p:txBody>
+        </p:sp>
+        <p:sp>
+          <p:nvSpPr>
+            <p:cNvPr id="37" name="TextBox 36">
+              <a:extLst>
+                <a:ext uri="{FF2B5EF4-FFF2-40B4-BE49-F238E27FC236}">
+                  <a16:creationId xmlns:a16="http://schemas.microsoft.com/office/drawing/2014/main" id="{7F825E6B-BE6C-8C41-B822-BDDC11D0858A}"/>
+                </a:ext>
+              </a:extLst>
+            </p:cNvPr>
+            <p:cNvSpPr txBox="1"/>
+            <p:nvPr/>
+          </p:nvSpPr>
+          <p:spPr>
+            <a:xfrm>
+              <a:off x="4323246" y="4120702"/>
+              <a:ext cx="914400" cy="369332"/>
+            </a:xfrm>
+            <a:prstGeom prst="rect">
+              <a:avLst/>
+            </a:prstGeom>
+            <a:noFill/>
+          </p:spPr>
+          <p:txBody>
+            <a:bodyPr wrap="square" rtlCol="0">
+              <a:spAutoFit/>
+            </a:bodyPr>
+            <a:lstStyle/>
+            <a:p>
+              <a:r>
+                <a:rPr lang="en-GB" i="1" dirty="0"/>
+                <a:t>Clone</a:t>
+              </a:r>
+            </a:p>
+          </p:txBody>
+        </p:sp>
+        <p:sp>
+          <p:nvSpPr>
+            <p:cNvPr id="38" name="Rectangle 37">
+              <a:extLst>
+                <a:ext uri="{FF2B5EF4-FFF2-40B4-BE49-F238E27FC236}">
+                  <a16:creationId xmlns:a16="http://schemas.microsoft.com/office/drawing/2014/main" id="{E749EDAB-BD38-404F-9ABD-BF00C9C47E5C}"/>
+                </a:ext>
+              </a:extLst>
+            </p:cNvPr>
+            <p:cNvSpPr/>
+            <p:nvPr/>
+          </p:nvSpPr>
+          <p:spPr>
+            <a:xfrm>
+              <a:off x="2239458" y="347241"/>
+              <a:ext cx="8293504" cy="3081759"/>
+            </a:xfrm>
+            <a:prstGeom prst="rect">
+              <a:avLst/>
+            </a:prstGeom>
+            <a:noFill/>
+            <a:ln>
+              <a:solidFill>
+                <a:schemeClr val="tx1"/>
+              </a:solidFill>
+              <a:prstDash val="sysDash"/>
+            </a:ln>
+          </p:spPr>
+          <p:style>
+            <a:lnRef idx="2">
+              <a:schemeClr val="accent1">
+                <a:shade val="50000"/>
+              </a:schemeClr>
+            </a:lnRef>
+            <a:fillRef idx="1">
+              <a:schemeClr val="accent1"/>
+            </a:fillRef>
+            <a:effectRef idx="0">
+              <a:schemeClr val="accent1"/>
+            </a:effectRef>
+            <a:fontRef idx="minor">
+              <a:schemeClr val="lt1"/>
+            </a:fontRef>
+          </p:style>
+          <p:txBody>
+            <a:bodyPr rtlCol="0" anchor="ctr"/>
+            <a:lstStyle/>
+            <a:p>
+              <a:pPr algn="ctr"/>
+              <a:endParaRPr lang="en-GB"/>
+            </a:p>
+          </p:txBody>
+        </p:sp>
+        <p:sp>
+          <p:nvSpPr>
+            <p:cNvPr id="39" name="TextBox 38">
+              <a:extLst>
+                <a:ext uri="{FF2B5EF4-FFF2-40B4-BE49-F238E27FC236}">
+                  <a16:creationId xmlns:a16="http://schemas.microsoft.com/office/drawing/2014/main" id="{DC9C1064-EC90-4C49-A932-7D968C1362B5}"/>
+                </a:ext>
+              </a:extLst>
+            </p:cNvPr>
+            <p:cNvSpPr txBox="1"/>
+            <p:nvPr/>
+          </p:nvSpPr>
+          <p:spPr>
+            <a:xfrm>
+              <a:off x="3649135" y="6466282"/>
+              <a:ext cx="2805753" cy="369332"/>
+            </a:xfrm>
+            <a:prstGeom prst="rect">
+              <a:avLst/>
+            </a:prstGeom>
+            <a:noFill/>
+          </p:spPr>
+          <p:txBody>
+            <a:bodyPr wrap="square" rtlCol="0">
+              <a:spAutoFit/>
+            </a:bodyPr>
+            <a:lstStyle/>
+            <a:p>
+              <a:r>
+                <a:rPr lang="en-GB" i="1" dirty="0"/>
+                <a:t>Your own system</a:t>
+              </a:r>
+            </a:p>
+          </p:txBody>
+        </p:sp>
+        <p:sp>
+          <p:nvSpPr>
+            <p:cNvPr id="40" name="Rounded Rectangle 39">
+              <a:extLst>
+                <a:ext uri="{FF2B5EF4-FFF2-40B4-BE49-F238E27FC236}">
+                  <a16:creationId xmlns:a16="http://schemas.microsoft.com/office/drawing/2014/main" id="{EB0D579D-250D-CD4A-A5BB-D519FCA96F43}"/>
+                </a:ext>
+              </a:extLst>
+            </p:cNvPr>
+            <p:cNvSpPr/>
+            <p:nvPr/>
+          </p:nvSpPr>
+          <p:spPr>
+            <a:xfrm>
+              <a:off x="2257053" y="4788162"/>
+              <a:ext cx="914400" cy="914400"/>
+            </a:xfrm>
+            <a:prstGeom prst="roundRect">
+              <a:avLst/>
+            </a:prstGeom>
+          </p:spPr>
+          <p:style>
+            <a:lnRef idx="2">
+              <a:schemeClr val="accent1">
+                <a:shade val="50000"/>
+              </a:schemeClr>
+            </a:lnRef>
+            <a:fillRef idx="1">
+              <a:schemeClr val="accent1"/>
+            </a:fillRef>
+            <a:effectRef idx="0">
+              <a:schemeClr val="accent1"/>
+            </a:effectRef>
+            <a:fontRef idx="minor">
+              <a:schemeClr val="lt1"/>
+            </a:fontRef>
+          </p:style>
+          <p:txBody>
+            <a:bodyPr rtlCol="0" anchor="ctr"/>
+            <a:lstStyle/>
+            <a:p>
+              <a:pPr algn="ctr"/>
+              <a:r>
+                <a:rPr lang="en-GB" dirty="0"/>
+                <a:t>Git Repo</a:t>
+              </a:r>
+            </a:p>
+          </p:txBody>
+        </p:sp>
+        <p:cxnSp>
+          <p:nvCxnSpPr>
+            <p:cNvPr id="42" name="Straight Arrow Connector 41">
+              <a:extLst>
+                <a:ext uri="{FF2B5EF4-FFF2-40B4-BE49-F238E27FC236}">
+                  <a16:creationId xmlns:a16="http://schemas.microsoft.com/office/drawing/2014/main" id="{38407856-3E50-474E-92F8-CA4A9E533509}"/>
+                </a:ext>
+              </a:extLst>
+            </p:cNvPr>
+            <p:cNvCxnSpPr>
+              <a:cxnSpLocks/>
+              <a:stCxn id="7" idx="2"/>
+              <a:endCxn id="22" idx="3"/>
+            </p:cNvCxnSpPr>
+            <p:nvPr/>
+          </p:nvCxnSpPr>
+          <p:spPr>
+            <a:xfrm flipH="1">
+              <a:off x="4637814" y="2216073"/>
+              <a:ext cx="3592742" cy="3029290"/>
+            </a:xfrm>
+            <a:prstGeom prst="straightConnector1">
+              <a:avLst/>
+            </a:prstGeom>
+            <a:ln>
+              <a:prstDash val="dash"/>
+              <a:tailEnd type="triangle"/>
+            </a:ln>
+          </p:spPr>
+          <p:style>
+            <a:lnRef idx="1">
+              <a:schemeClr val="accent1"/>
+            </a:lnRef>
+            <a:fillRef idx="0">
+              <a:schemeClr val="accent1"/>
+            </a:fillRef>
+            <a:effectRef idx="0">
+              <a:schemeClr val="accent1"/>
+            </a:effectRef>
+            <a:fontRef idx="minor">
+              <a:schemeClr val="tx1"/>
+            </a:fontRef>
+          </p:style>
+        </p:cxnSp>
+        <p:cxnSp>
+          <p:nvCxnSpPr>
+            <p:cNvPr id="45" name="Straight Connector 44">
+              <a:extLst>
+                <a:ext uri="{FF2B5EF4-FFF2-40B4-BE49-F238E27FC236}">
+                  <a16:creationId xmlns:a16="http://schemas.microsoft.com/office/drawing/2014/main" id="{BAEA017C-9C86-4943-BA2A-3CBB6D6F63EB}"/>
+                </a:ext>
+              </a:extLst>
+            </p:cNvPr>
+            <p:cNvCxnSpPr>
+              <a:stCxn id="5" idx="2"/>
+              <a:endCxn id="40" idx="0"/>
+            </p:cNvCxnSpPr>
+            <p:nvPr/>
+          </p:nvCxnSpPr>
+          <p:spPr>
+            <a:xfrm flipH="1">
+              <a:off x="2714253" y="2216075"/>
+              <a:ext cx="582193" cy="2572087"/>
+            </a:xfrm>
+            <a:prstGeom prst="line">
+              <a:avLst/>
+            </a:prstGeom>
+            <a:ln>
+              <a:solidFill>
+                <a:schemeClr val="tx1"/>
+              </a:solidFill>
+              <a:prstDash val="sysDot"/>
+            </a:ln>
+          </p:spPr>
+          <p:style>
+            <a:lnRef idx="1">
+              <a:schemeClr val="accent1"/>
+            </a:lnRef>
+            <a:fillRef idx="0">
+              <a:schemeClr val="accent1"/>
+            </a:fillRef>
+            <a:effectRef idx="0">
+              <a:schemeClr val="accent1"/>
+            </a:effectRef>
+            <a:fontRef idx="minor">
+              <a:schemeClr val="tx1"/>
+            </a:fontRef>
+          </p:style>
+        </p:cxnSp>
+        <p:sp>
+          <p:nvSpPr>
+            <p:cNvPr id="47" name="TextBox 46">
+              <a:extLst>
+                <a:ext uri="{FF2B5EF4-FFF2-40B4-BE49-F238E27FC236}">
+                  <a16:creationId xmlns:a16="http://schemas.microsoft.com/office/drawing/2014/main" id="{47621E87-A9D7-2B4D-B90A-429BF427C6AE}"/>
+                </a:ext>
+              </a:extLst>
+            </p:cNvPr>
+            <p:cNvSpPr txBox="1"/>
+            <p:nvPr/>
+          </p:nvSpPr>
+          <p:spPr>
+            <a:xfrm>
+              <a:off x="6225915" y="327403"/>
+              <a:ext cx="4307047" cy="369332"/>
+            </a:xfrm>
+            <a:prstGeom prst="rect">
+              <a:avLst/>
+            </a:prstGeom>
+            <a:noFill/>
+          </p:spPr>
+          <p:txBody>
+            <a:bodyPr wrap="square" rtlCol="0">
+              <a:spAutoFit/>
+            </a:bodyPr>
+            <a:lstStyle/>
+            <a:p>
+              <a:r>
+                <a:rPr lang="en-GB" i="1" dirty="0"/>
+                <a:t>Your Collaborator’s External Git Repositories</a:t>
+              </a:r>
+            </a:p>
+          </p:txBody>
+        </p:sp>
+        <p:sp>
+          <p:nvSpPr>
+            <p:cNvPr id="49" name="TextBox 48">
+              <a:extLst>
+                <a:ext uri="{FF2B5EF4-FFF2-40B4-BE49-F238E27FC236}">
+                  <a16:creationId xmlns:a16="http://schemas.microsoft.com/office/drawing/2014/main" id="{AF74113E-2C1C-4542-8982-DAB29EA3B265}"/>
+                </a:ext>
+              </a:extLst>
+            </p:cNvPr>
+            <p:cNvSpPr txBox="1"/>
+            <p:nvPr/>
+          </p:nvSpPr>
+          <p:spPr>
+            <a:xfrm>
+              <a:off x="2666532" y="327403"/>
+              <a:ext cx="3028164" cy="369332"/>
+            </a:xfrm>
+            <a:prstGeom prst="rect">
+              <a:avLst/>
+            </a:prstGeom>
+            <a:noFill/>
+          </p:spPr>
+          <p:txBody>
+            <a:bodyPr wrap="square" rtlCol="0">
+              <a:spAutoFit/>
+            </a:bodyPr>
+            <a:lstStyle/>
+            <a:p>
+              <a:r>
+                <a:rPr lang="en-GB" i="1" dirty="0"/>
+                <a:t>Your External Git Repositories</a:t>
+              </a:r>
+            </a:p>
+          </p:txBody>
+        </p:sp>
+      </p:grpSp>
+    </p:spTree>
+    <p:extLst>
+      <p:ext uri="{BB962C8B-B14F-4D97-AF65-F5344CB8AC3E}">
+        <p14:creationId xmlns:p14="http://schemas.microsoft.com/office/powerpoint/2010/main" val="3825043229"/>
       </p:ext>
     </p:extLst>
   </p:cSld>

</xml_diff>

<commit_message>
Small modifications to the diagram for notes.
</commit_message>
<xml_diff>
--- a/slides/GitCollaborativeModels.pptx
+++ b/slides/GitCollaborativeModels.pptx
@@ -12664,10 +12664,10 @@
       </p:grpSpPr>
       <p:grpSp>
         <p:nvGrpSpPr>
-          <p:cNvPr id="50" name="Group 49">
-            <a:extLst>
-              <a:ext uri="{FF2B5EF4-FFF2-40B4-BE49-F238E27FC236}">
-                <a16:creationId xmlns:a16="http://schemas.microsoft.com/office/drawing/2014/main" id="{85375E4E-96A0-DD4D-8C32-FF851703994F}"/>
+          <p:cNvPr id="9" name="Group 8">
+            <a:extLst>
+              <a:ext uri="{FF2B5EF4-FFF2-40B4-BE49-F238E27FC236}">
+                <a16:creationId xmlns:a16="http://schemas.microsoft.com/office/drawing/2014/main" id="{DE408D82-475B-4A4D-B19A-DFE0DF0EB8B1}"/>
               </a:ext>
             </a:extLst>
           </p:cNvPr>
@@ -12677,17 +12677,17 @@
         <p:grpSpPr>
           <a:xfrm>
             <a:off x="600075" y="327403"/>
-            <a:ext cx="9979034" cy="6508211"/>
+            <a:ext cx="9979034" cy="6477433"/>
             <a:chOff x="600075" y="327403"/>
-            <a:chExt cx="9979034" cy="6508211"/>
+            <a:chExt cx="9979034" cy="6477433"/>
           </a:xfrm>
         </p:grpSpPr>
         <p:grpSp>
           <p:nvGrpSpPr>
-            <p:cNvPr id="3" name="Group 2">
+            <p:cNvPr id="50" name="Group 49">
               <a:extLst>
                 <a:ext uri="{FF2B5EF4-FFF2-40B4-BE49-F238E27FC236}">
-                  <a16:creationId xmlns:a16="http://schemas.microsoft.com/office/drawing/2014/main" id="{C5E32C1B-610E-C74E-AB1D-F36B3CE0ADF6}"/>
+                  <a16:creationId xmlns:a16="http://schemas.microsoft.com/office/drawing/2014/main" id="{85375E4E-96A0-DD4D-8C32-FF851703994F}"/>
                 </a:ext>
               </a:extLst>
             </p:cNvPr>
@@ -12696,18 +12696,264 @@
           </p:nvGrpSpPr>
           <p:grpSpPr>
             <a:xfrm>
-              <a:off x="2493033" y="629963"/>
-              <a:ext cx="3028950" cy="2571750"/>
-              <a:chOff x="2493033" y="1218275"/>
-              <a:chExt cx="3028950" cy="2571750"/>
+              <a:off x="600075" y="327403"/>
+              <a:ext cx="9979034" cy="6477433"/>
+              <a:chOff x="600075" y="327403"/>
+              <a:chExt cx="9979034" cy="6477433"/>
             </a:xfrm>
           </p:grpSpPr>
+          <p:grpSp>
+            <p:nvGrpSpPr>
+              <p:cNvPr id="3" name="Group 2">
+                <a:extLst>
+                  <a:ext uri="{FF2B5EF4-FFF2-40B4-BE49-F238E27FC236}">
+                    <a16:creationId xmlns:a16="http://schemas.microsoft.com/office/drawing/2014/main" id="{C5E32C1B-610E-C74E-AB1D-F36B3CE0ADF6}"/>
+                  </a:ext>
+                </a:extLst>
+              </p:cNvPr>
+              <p:cNvGrpSpPr/>
+              <p:nvPr/>
+            </p:nvGrpSpPr>
+            <p:grpSpPr>
+              <a:xfrm>
+                <a:off x="2493033" y="629963"/>
+                <a:ext cx="3028950" cy="2571750"/>
+                <a:chOff x="2493033" y="1218275"/>
+                <a:chExt cx="3028950" cy="2571750"/>
+              </a:xfrm>
+            </p:grpSpPr>
+            <p:sp>
+              <p:nvSpPr>
+                <p:cNvPr id="4" name="Rectangle 3">
+                  <a:extLst>
+                    <a:ext uri="{FF2B5EF4-FFF2-40B4-BE49-F238E27FC236}">
+                      <a16:creationId xmlns:a16="http://schemas.microsoft.com/office/drawing/2014/main" id="{9AAFD2ED-DE35-504F-A218-DD8067E5E91F}"/>
+                    </a:ext>
+                  </a:extLst>
+                </p:cNvPr>
+                <p:cNvSpPr/>
+                <p:nvPr/>
+              </p:nvSpPr>
+              <p:spPr>
+                <a:xfrm>
+                  <a:off x="2493033" y="1218275"/>
+                  <a:ext cx="3028950" cy="2571750"/>
+                </a:xfrm>
+                <a:prstGeom prst="rect">
+                  <a:avLst/>
+                </a:prstGeom>
+                <a:noFill/>
+                <a:ln>
+                  <a:prstDash val="lgDash"/>
+                </a:ln>
+              </p:spPr>
+              <p:style>
+                <a:lnRef idx="2">
+                  <a:schemeClr val="accent1">
+                    <a:shade val="50000"/>
+                  </a:schemeClr>
+                </a:lnRef>
+                <a:fillRef idx="1">
+                  <a:schemeClr val="accent1"/>
+                </a:fillRef>
+                <a:effectRef idx="0">
+                  <a:schemeClr val="accent1"/>
+                </a:effectRef>
+                <a:fontRef idx="minor">
+                  <a:schemeClr val="lt1"/>
+                </a:fontRef>
+              </p:style>
+              <p:txBody>
+                <a:bodyPr rtlCol="0" anchor="ctr"/>
+                <a:lstStyle/>
+                <a:p>
+                  <a:pPr algn="ctr"/>
+                  <a:endParaRPr lang="en-GB"/>
+                </a:p>
+              </p:txBody>
+            </p:sp>
+            <p:sp>
+              <p:nvSpPr>
+                <p:cNvPr id="5" name="Rounded Rectangle 4">
+                  <a:extLst>
+                    <a:ext uri="{FF2B5EF4-FFF2-40B4-BE49-F238E27FC236}">
+                      <a16:creationId xmlns:a16="http://schemas.microsoft.com/office/drawing/2014/main" id="{BEBC37E2-95BD-5949-B1B5-6717F91E5ABB}"/>
+                    </a:ext>
+                  </a:extLst>
+                </p:cNvPr>
+                <p:cNvSpPr/>
+                <p:nvPr/>
+              </p:nvSpPr>
+              <p:spPr>
+                <a:xfrm>
+                  <a:off x="2839246" y="2177724"/>
+                  <a:ext cx="914400" cy="626663"/>
+                </a:xfrm>
+                <a:prstGeom prst="roundRect">
+                  <a:avLst/>
+                </a:prstGeom>
+                <a:solidFill>
+                  <a:srgbClr val="FF0000"/>
+                </a:solidFill>
+              </p:spPr>
+              <p:style>
+                <a:lnRef idx="2">
+                  <a:schemeClr val="accent1">
+                    <a:shade val="50000"/>
+                  </a:schemeClr>
+                </a:lnRef>
+                <a:fillRef idx="1">
+                  <a:schemeClr val="accent1"/>
+                </a:fillRef>
+                <a:effectRef idx="0">
+                  <a:schemeClr val="accent1"/>
+                </a:effectRef>
+                <a:fontRef idx="minor">
+                  <a:schemeClr val="lt1"/>
+                </a:fontRef>
+              </p:style>
+              <p:txBody>
+                <a:bodyPr rtlCol="0" anchor="ctr"/>
+                <a:lstStyle/>
+                <a:p>
+                  <a:pPr algn="ctr"/>
+                  <a:r>
+                    <a:rPr lang="en-GB" dirty="0"/>
+                    <a:t>Git Repo</a:t>
+                  </a:r>
+                </a:p>
+              </p:txBody>
+            </p:sp>
+          </p:grpSp>
+          <p:grpSp>
+            <p:nvGrpSpPr>
+              <p:cNvPr id="8" name="Group 7">
+                <a:extLst>
+                  <a:ext uri="{FF2B5EF4-FFF2-40B4-BE49-F238E27FC236}">
+                    <a16:creationId xmlns:a16="http://schemas.microsoft.com/office/drawing/2014/main" id="{264F3919-3EDF-BE42-8980-3439D3B3348D}"/>
+                  </a:ext>
+                </a:extLst>
+              </p:cNvPr>
+              <p:cNvGrpSpPr/>
+              <p:nvPr/>
+            </p:nvGrpSpPr>
+            <p:grpSpPr>
+              <a:xfrm>
+                <a:off x="6900951" y="616867"/>
+                <a:ext cx="3028950" cy="2571750"/>
+                <a:chOff x="7109295" y="1127679"/>
+                <a:chExt cx="3028950" cy="2571750"/>
+              </a:xfrm>
+            </p:grpSpPr>
+            <p:sp>
+              <p:nvSpPr>
+                <p:cNvPr id="6" name="Rectangle 5">
+                  <a:extLst>
+                    <a:ext uri="{FF2B5EF4-FFF2-40B4-BE49-F238E27FC236}">
+                      <a16:creationId xmlns:a16="http://schemas.microsoft.com/office/drawing/2014/main" id="{951DC552-D816-8245-80D8-D0637753EFCC}"/>
+                    </a:ext>
+                  </a:extLst>
+                </p:cNvPr>
+                <p:cNvSpPr/>
+                <p:nvPr/>
+              </p:nvSpPr>
+              <p:spPr>
+                <a:xfrm>
+                  <a:off x="7109295" y="1127679"/>
+                  <a:ext cx="3028950" cy="2571750"/>
+                </a:xfrm>
+                <a:prstGeom prst="rect">
+                  <a:avLst/>
+                </a:prstGeom>
+                <a:noFill/>
+                <a:ln>
+                  <a:prstDash val="lgDash"/>
+                </a:ln>
+              </p:spPr>
+              <p:style>
+                <a:lnRef idx="2">
+                  <a:schemeClr val="accent1">
+                    <a:shade val="50000"/>
+                  </a:schemeClr>
+                </a:lnRef>
+                <a:fillRef idx="1">
+                  <a:schemeClr val="accent1"/>
+                </a:fillRef>
+                <a:effectRef idx="0">
+                  <a:schemeClr val="accent1"/>
+                </a:effectRef>
+                <a:fontRef idx="minor">
+                  <a:schemeClr val="lt1"/>
+                </a:fontRef>
+              </p:style>
+              <p:txBody>
+                <a:bodyPr rtlCol="0" anchor="ctr"/>
+                <a:lstStyle/>
+                <a:p>
+                  <a:pPr algn="ctr"/>
+                  <a:endParaRPr lang="en-GB"/>
+                </a:p>
+              </p:txBody>
+            </p:sp>
+            <p:sp>
+              <p:nvSpPr>
+                <p:cNvPr id="7" name="Rounded Rectangle 6">
+                  <a:extLst>
+                    <a:ext uri="{FF2B5EF4-FFF2-40B4-BE49-F238E27FC236}">
+                      <a16:creationId xmlns:a16="http://schemas.microsoft.com/office/drawing/2014/main" id="{7F407F7F-8AE2-4C42-9A2B-5EBF40177DBD}"/>
+                    </a:ext>
+                  </a:extLst>
+                </p:cNvPr>
+                <p:cNvSpPr/>
+                <p:nvPr/>
+              </p:nvSpPr>
+              <p:spPr>
+                <a:xfrm>
+                  <a:off x="7981700" y="2100222"/>
+                  <a:ext cx="914400" cy="626663"/>
+                </a:xfrm>
+                <a:prstGeom prst="roundRect">
+                  <a:avLst/>
+                </a:prstGeom>
+                <a:solidFill>
+                  <a:srgbClr val="00B050"/>
+                </a:solidFill>
+              </p:spPr>
+              <p:style>
+                <a:lnRef idx="2">
+                  <a:schemeClr val="accent1">
+                    <a:shade val="50000"/>
+                  </a:schemeClr>
+                </a:lnRef>
+                <a:fillRef idx="1">
+                  <a:schemeClr val="accent1"/>
+                </a:fillRef>
+                <a:effectRef idx="0">
+                  <a:schemeClr val="accent1"/>
+                </a:effectRef>
+                <a:fontRef idx="minor">
+                  <a:schemeClr val="lt1"/>
+                </a:fontRef>
+              </p:style>
+              <p:txBody>
+                <a:bodyPr rtlCol="0" anchor="ctr"/>
+                <a:lstStyle/>
+                <a:p>
+                  <a:pPr algn="ctr"/>
+                  <a:r>
+                    <a:rPr lang="en-GB" dirty="0"/>
+                    <a:t>Git Repo</a:t>
+                  </a:r>
+                </a:p>
+              </p:txBody>
+            </p:sp>
+          </p:grpSp>
           <p:sp>
             <p:nvSpPr>
-              <p:cNvPr id="4" name="Rectangle 3">
+              <p:cNvPr id="14" name="Rounded Rectangle 13">
                 <a:extLst>
                   <a:ext uri="{FF2B5EF4-FFF2-40B4-BE49-F238E27FC236}">
-                    <a16:creationId xmlns:a16="http://schemas.microsoft.com/office/drawing/2014/main" id="{9AAFD2ED-DE35-504F-A218-DD8067E5E91F}"/>
+                    <a16:creationId xmlns:a16="http://schemas.microsoft.com/office/drawing/2014/main" id="{BC01A2CE-04EA-4A41-95BA-CD72B5443E98}"/>
                   </a:ext>
                 </a:extLst>
               </p:cNvPr>
@@ -12716,180 +12962,7 @@
             </p:nvSpPr>
             <p:spPr>
               <a:xfrm>
-                <a:off x="2493033" y="1218275"/>
-                <a:ext cx="3028950" cy="2571750"/>
-              </a:xfrm>
-              <a:prstGeom prst="rect">
-                <a:avLst/>
-              </a:prstGeom>
-              <a:noFill/>
-              <a:ln>
-                <a:prstDash val="lgDash"/>
-              </a:ln>
-            </p:spPr>
-            <p:style>
-              <a:lnRef idx="2">
-                <a:schemeClr val="accent1">
-                  <a:shade val="50000"/>
-                </a:schemeClr>
-              </a:lnRef>
-              <a:fillRef idx="1">
-                <a:schemeClr val="accent1"/>
-              </a:fillRef>
-              <a:effectRef idx="0">
-                <a:schemeClr val="accent1"/>
-              </a:effectRef>
-              <a:fontRef idx="minor">
-                <a:schemeClr val="lt1"/>
-              </a:fontRef>
-            </p:style>
-            <p:txBody>
-              <a:bodyPr rtlCol="0" anchor="ctr"/>
-              <a:lstStyle/>
-              <a:p>
-                <a:pPr algn="ctr"/>
-                <a:endParaRPr lang="en-GB"/>
-              </a:p>
-            </p:txBody>
-          </p:sp>
-          <p:sp>
-            <p:nvSpPr>
-              <p:cNvPr id="5" name="Rounded Rectangle 4">
-                <a:extLst>
-                  <a:ext uri="{FF2B5EF4-FFF2-40B4-BE49-F238E27FC236}">
-                    <a16:creationId xmlns:a16="http://schemas.microsoft.com/office/drawing/2014/main" id="{BEBC37E2-95BD-5949-B1B5-6717F91E5ABB}"/>
-                  </a:ext>
-                </a:extLst>
-              </p:cNvPr>
-              <p:cNvSpPr/>
-              <p:nvPr/>
-            </p:nvSpPr>
-            <p:spPr>
-              <a:xfrm>
-                <a:off x="2839246" y="2177724"/>
-                <a:ext cx="914400" cy="626663"/>
-              </a:xfrm>
-              <a:prstGeom prst="roundRect">
-                <a:avLst/>
-              </a:prstGeom>
-              <a:solidFill>
-                <a:srgbClr val="FF0000"/>
-              </a:solidFill>
-            </p:spPr>
-            <p:style>
-              <a:lnRef idx="2">
-                <a:schemeClr val="accent1">
-                  <a:shade val="50000"/>
-                </a:schemeClr>
-              </a:lnRef>
-              <a:fillRef idx="1">
-                <a:schemeClr val="accent1"/>
-              </a:fillRef>
-              <a:effectRef idx="0">
-                <a:schemeClr val="accent1"/>
-              </a:effectRef>
-              <a:fontRef idx="minor">
-                <a:schemeClr val="lt1"/>
-              </a:fontRef>
-            </p:style>
-            <p:txBody>
-              <a:bodyPr rtlCol="0" anchor="ctr"/>
-              <a:lstStyle/>
-              <a:p>
-                <a:pPr algn="ctr"/>
-                <a:r>
-                  <a:rPr lang="en-GB" dirty="0"/>
-                  <a:t>Git Repo</a:t>
-                </a:r>
-              </a:p>
-            </p:txBody>
-          </p:sp>
-        </p:grpSp>
-        <p:grpSp>
-          <p:nvGrpSpPr>
-            <p:cNvPr id="8" name="Group 7">
-              <a:extLst>
-                <a:ext uri="{FF2B5EF4-FFF2-40B4-BE49-F238E27FC236}">
-                  <a16:creationId xmlns:a16="http://schemas.microsoft.com/office/drawing/2014/main" id="{264F3919-3EDF-BE42-8980-3439D3B3348D}"/>
-                </a:ext>
-              </a:extLst>
-            </p:cNvPr>
-            <p:cNvGrpSpPr/>
-            <p:nvPr/>
-          </p:nvGrpSpPr>
-          <p:grpSpPr>
-            <a:xfrm>
-              <a:off x="6900951" y="616867"/>
-              <a:ext cx="3028950" cy="2571750"/>
-              <a:chOff x="7109295" y="1127679"/>
-              <a:chExt cx="3028950" cy="2571750"/>
-            </a:xfrm>
-          </p:grpSpPr>
-          <p:sp>
-            <p:nvSpPr>
-              <p:cNvPr id="6" name="Rectangle 5">
-                <a:extLst>
-                  <a:ext uri="{FF2B5EF4-FFF2-40B4-BE49-F238E27FC236}">
-                    <a16:creationId xmlns:a16="http://schemas.microsoft.com/office/drawing/2014/main" id="{951DC552-D816-8245-80D8-D0637753EFCC}"/>
-                  </a:ext>
-                </a:extLst>
-              </p:cNvPr>
-              <p:cNvSpPr/>
-              <p:nvPr/>
-            </p:nvSpPr>
-            <p:spPr>
-              <a:xfrm>
-                <a:off x="7109295" y="1127679"/>
-                <a:ext cx="3028950" cy="2571750"/>
-              </a:xfrm>
-              <a:prstGeom prst="rect">
-                <a:avLst/>
-              </a:prstGeom>
-              <a:noFill/>
-              <a:ln>
-                <a:prstDash val="lgDash"/>
-              </a:ln>
-            </p:spPr>
-            <p:style>
-              <a:lnRef idx="2">
-                <a:schemeClr val="accent1">
-                  <a:shade val="50000"/>
-                </a:schemeClr>
-              </a:lnRef>
-              <a:fillRef idx="1">
-                <a:schemeClr val="accent1"/>
-              </a:fillRef>
-              <a:effectRef idx="0">
-                <a:schemeClr val="accent1"/>
-              </a:effectRef>
-              <a:fontRef idx="minor">
-                <a:schemeClr val="lt1"/>
-              </a:fontRef>
-            </p:style>
-            <p:txBody>
-              <a:bodyPr rtlCol="0" anchor="ctr"/>
-              <a:lstStyle/>
-              <a:p>
-                <a:pPr algn="ctr"/>
-                <a:endParaRPr lang="en-GB"/>
-              </a:p>
-            </p:txBody>
-          </p:sp>
-          <p:sp>
-            <p:nvSpPr>
-              <p:cNvPr id="7" name="Rounded Rectangle 6">
-                <a:extLst>
-                  <a:ext uri="{FF2B5EF4-FFF2-40B4-BE49-F238E27FC236}">
-                    <a16:creationId xmlns:a16="http://schemas.microsoft.com/office/drawing/2014/main" id="{7F407F7F-8AE2-4C42-9A2B-5EBF40177DBD}"/>
-                  </a:ext>
-                </a:extLst>
-              </p:cNvPr>
-              <p:cNvSpPr/>
-              <p:nvPr/>
-            </p:nvSpPr>
-            <p:spPr>
-              <a:xfrm>
-                <a:off x="7981700" y="2100222"/>
+                <a:off x="4180614" y="1589411"/>
                 <a:ext cx="914400" cy="626663"/>
               </a:xfrm>
               <a:prstGeom prst="roundRect">
@@ -12927,243 +13000,784 @@
               </a:p>
             </p:txBody>
           </p:sp>
+          <p:pic>
+            <p:nvPicPr>
+              <p:cNvPr id="16" name="Picture 15">
+                <a:extLst>
+                  <a:ext uri="{FF2B5EF4-FFF2-40B4-BE49-F238E27FC236}">
+                    <a16:creationId xmlns:a16="http://schemas.microsoft.com/office/drawing/2014/main" id="{87B1F67C-8B6B-4947-9736-E23954A1F28B}"/>
+                  </a:ext>
+                </a:extLst>
+              </p:cNvPr>
+              <p:cNvPicPr>
+                <a:picLocks noChangeAspect="1"/>
+              </p:cNvPicPr>
+              <p:nvPr/>
+            </p:nvPicPr>
+            <p:blipFill>
+              <a:blip r:embed="rId2"/>
+              <a:stretch>
+                <a:fillRect/>
+              </a:stretch>
+            </p:blipFill>
+            <p:spPr>
+              <a:xfrm>
+                <a:off x="834575" y="4792079"/>
+                <a:ext cx="998372" cy="1080000"/>
+              </a:xfrm>
+              <a:prstGeom prst="rect">
+                <a:avLst/>
+              </a:prstGeom>
+            </p:spPr>
+          </p:pic>
+          <p:sp>
+            <p:nvSpPr>
+              <p:cNvPr id="18" name="Rectangle 17">
+                <a:extLst>
+                  <a:ext uri="{FF2B5EF4-FFF2-40B4-BE49-F238E27FC236}">
+                    <a16:creationId xmlns:a16="http://schemas.microsoft.com/office/drawing/2014/main" id="{4938C13F-9874-C94D-9442-7031189DA2E9}"/>
+                  </a:ext>
+                </a:extLst>
+              </p:cNvPr>
+              <p:cNvSpPr/>
+              <p:nvPr/>
+            </p:nvSpPr>
+            <p:spPr>
+              <a:xfrm>
+                <a:off x="600075" y="3886200"/>
+                <a:ext cx="4793728" cy="2571750"/>
+              </a:xfrm>
+              <a:prstGeom prst="rect">
+                <a:avLst/>
+              </a:prstGeom>
+              <a:noFill/>
+              <a:ln>
+                <a:prstDash val="lgDash"/>
+              </a:ln>
+            </p:spPr>
+            <p:style>
+              <a:lnRef idx="2">
+                <a:schemeClr val="accent1">
+                  <a:shade val="50000"/>
+                </a:schemeClr>
+              </a:lnRef>
+              <a:fillRef idx="1">
+                <a:schemeClr val="accent1"/>
+              </a:fillRef>
+              <a:effectRef idx="0">
+                <a:schemeClr val="accent1"/>
+              </a:effectRef>
+              <a:fontRef idx="minor">
+                <a:schemeClr val="lt1"/>
+              </a:fontRef>
+            </p:style>
+            <p:txBody>
+              <a:bodyPr rtlCol="0" anchor="ctr"/>
+              <a:lstStyle/>
+              <a:p>
+                <a:pPr algn="ctr"/>
+                <a:endParaRPr lang="en-GB"/>
+              </a:p>
+            </p:txBody>
+          </p:sp>
+          <p:sp>
+            <p:nvSpPr>
+              <p:cNvPr id="22" name="Rounded Rectangle 21">
+                <a:extLst>
+                  <a:ext uri="{FF2B5EF4-FFF2-40B4-BE49-F238E27FC236}">
+                    <a16:creationId xmlns:a16="http://schemas.microsoft.com/office/drawing/2014/main" id="{13281585-0573-C44C-835E-0AFAAC4F1A40}"/>
+                  </a:ext>
+                </a:extLst>
+              </p:cNvPr>
+              <p:cNvSpPr/>
+              <p:nvPr/>
+            </p:nvSpPr>
+            <p:spPr>
+              <a:xfrm>
+                <a:off x="3723414" y="4932031"/>
+                <a:ext cx="914400" cy="626663"/>
+              </a:xfrm>
+              <a:prstGeom prst="roundRect">
+                <a:avLst/>
+              </a:prstGeom>
+              <a:solidFill>
+                <a:srgbClr val="00B050"/>
+              </a:solidFill>
+            </p:spPr>
+            <p:style>
+              <a:lnRef idx="2">
+                <a:schemeClr val="accent1">
+                  <a:shade val="50000"/>
+                </a:schemeClr>
+              </a:lnRef>
+              <a:fillRef idx="1">
+                <a:schemeClr val="accent1"/>
+              </a:fillRef>
+              <a:effectRef idx="0">
+                <a:schemeClr val="accent1"/>
+              </a:effectRef>
+              <a:fontRef idx="minor">
+                <a:schemeClr val="lt1"/>
+              </a:fontRef>
+            </p:style>
+            <p:txBody>
+              <a:bodyPr rtlCol="0" anchor="ctr"/>
+              <a:lstStyle/>
+              <a:p>
+                <a:pPr algn="ctr"/>
+                <a:r>
+                  <a:rPr lang="en-GB" dirty="0"/>
+                  <a:t>Git Repo</a:t>
+                </a:r>
+              </a:p>
+            </p:txBody>
+          </p:sp>
+          <p:cxnSp>
+            <p:nvCxnSpPr>
+              <p:cNvPr id="23" name="Elbow Connector 22">
+                <a:extLst>
+                  <a:ext uri="{FF2B5EF4-FFF2-40B4-BE49-F238E27FC236}">
+                    <a16:creationId xmlns:a16="http://schemas.microsoft.com/office/drawing/2014/main" id="{36915D43-6F01-5B4F-A0B8-8F8895721E49}"/>
+                  </a:ext>
+                </a:extLst>
+              </p:cNvPr>
+              <p:cNvCxnSpPr>
+                <a:cxnSpLocks/>
+              </p:cNvCxnSpPr>
+              <p:nvPr/>
+            </p:nvCxnSpPr>
+            <p:spPr>
+              <a:xfrm rot="10800000" flipV="1">
+                <a:off x="5095014" y="1902741"/>
+                <a:ext cx="2678342" cy="1"/>
+              </a:xfrm>
+              <a:prstGeom prst="bentConnector3">
+                <a:avLst>
+                  <a:gd name="adj1" fmla="val 50000"/>
+                </a:avLst>
+              </a:prstGeom>
+              <a:ln w="76200">
+                <a:solidFill>
+                  <a:srgbClr val="FF0000"/>
+                </a:solidFill>
+                <a:tailEnd type="triangle"/>
+              </a:ln>
+            </p:spPr>
+            <p:style>
+              <a:lnRef idx="1">
+                <a:schemeClr val="accent1"/>
+              </a:lnRef>
+              <a:fillRef idx="0">
+                <a:schemeClr val="accent1"/>
+              </a:fillRef>
+              <a:effectRef idx="0">
+                <a:schemeClr val="accent1"/>
+              </a:effectRef>
+              <a:fontRef idx="minor">
+                <a:schemeClr val="tx1"/>
+              </a:fontRef>
+            </p:style>
+          </p:cxnSp>
+          <p:sp>
+            <p:nvSpPr>
+              <p:cNvPr id="24" name="TextBox 23">
+                <a:extLst>
+                  <a:ext uri="{FF2B5EF4-FFF2-40B4-BE49-F238E27FC236}">
+                    <a16:creationId xmlns:a16="http://schemas.microsoft.com/office/drawing/2014/main" id="{7CECE6BB-3BE6-194A-9371-7DD1730FFDAE}"/>
+                  </a:ext>
+                </a:extLst>
+              </p:cNvPr>
+              <p:cNvSpPr txBox="1"/>
+              <p:nvPr/>
+            </p:nvSpPr>
+            <p:spPr>
+              <a:xfrm>
+                <a:off x="7773356" y="3462222"/>
+                <a:ext cx="2805753" cy="338554"/>
+              </a:xfrm>
+              <a:prstGeom prst="rect">
+                <a:avLst/>
+              </a:prstGeom>
+              <a:noFill/>
+            </p:spPr>
+            <p:txBody>
+              <a:bodyPr wrap="square" rtlCol="0">
+                <a:spAutoFit/>
+              </a:bodyPr>
+              <a:lstStyle/>
+              <a:p>
+                <a:r>
+                  <a:rPr lang="en-GB" sz="1600" i="1" dirty="0"/>
+                  <a:t>External Git Service Provider</a:t>
+                </a:r>
+              </a:p>
+            </p:txBody>
+          </p:sp>
+          <p:sp>
+            <p:nvSpPr>
+              <p:cNvPr id="27" name="TextBox 26">
+                <a:extLst>
+                  <a:ext uri="{FF2B5EF4-FFF2-40B4-BE49-F238E27FC236}">
+                    <a16:creationId xmlns:a16="http://schemas.microsoft.com/office/drawing/2014/main" id="{3F382545-97DB-4D46-A3BE-B4D7CEBB0DF9}"/>
+                  </a:ext>
+                </a:extLst>
+              </p:cNvPr>
+              <p:cNvSpPr txBox="1"/>
+              <p:nvPr/>
+            </p:nvSpPr>
+            <p:spPr>
+              <a:xfrm>
+                <a:off x="3063123" y="1289818"/>
+                <a:ext cx="514430" cy="338554"/>
+              </a:xfrm>
+              <a:prstGeom prst="rect">
+                <a:avLst/>
+              </a:prstGeom>
+              <a:noFill/>
+            </p:spPr>
+            <p:txBody>
+              <a:bodyPr wrap="square" rtlCol="0">
+                <a:spAutoFit/>
+              </a:bodyPr>
+              <a:lstStyle/>
+              <a:p>
+                <a:r>
+                  <a:rPr lang="en-GB" sz="1600" i="1" dirty="0"/>
+                  <a:t>R1</a:t>
+                </a:r>
+                <a:endParaRPr lang="en-GB" i="1" dirty="0"/>
+              </a:p>
+            </p:txBody>
+          </p:sp>
+          <p:sp>
+            <p:nvSpPr>
+              <p:cNvPr id="29" name="TextBox 28">
+                <a:extLst>
+                  <a:ext uri="{FF2B5EF4-FFF2-40B4-BE49-F238E27FC236}">
+                    <a16:creationId xmlns:a16="http://schemas.microsoft.com/office/drawing/2014/main" id="{DFFCD99B-D7FE-7A47-B089-C5BD3BC579A1}"/>
+                  </a:ext>
+                </a:extLst>
+              </p:cNvPr>
+              <p:cNvSpPr txBox="1"/>
+              <p:nvPr/>
+            </p:nvSpPr>
+            <p:spPr>
+              <a:xfrm>
+                <a:off x="4442091" y="1252580"/>
+                <a:ext cx="514430" cy="338554"/>
+              </a:xfrm>
+              <a:prstGeom prst="rect">
+                <a:avLst/>
+              </a:prstGeom>
+              <a:noFill/>
+            </p:spPr>
+            <p:txBody>
+              <a:bodyPr wrap="square" rtlCol="0">
+                <a:spAutoFit/>
+              </a:bodyPr>
+              <a:lstStyle/>
+              <a:p>
+                <a:r>
+                  <a:rPr lang="en-GB" sz="1600" i="1" dirty="0"/>
+                  <a:t>R3</a:t>
+                </a:r>
+                <a:endParaRPr lang="en-GB" i="1" dirty="0"/>
+              </a:p>
+            </p:txBody>
+          </p:sp>
+          <p:sp>
+            <p:nvSpPr>
+              <p:cNvPr id="30" name="TextBox 29">
+                <a:extLst>
+                  <a:ext uri="{FF2B5EF4-FFF2-40B4-BE49-F238E27FC236}">
+                    <a16:creationId xmlns:a16="http://schemas.microsoft.com/office/drawing/2014/main" id="{DCC3A6B8-69C4-9546-ACC1-71EBA60DF0F1}"/>
+                  </a:ext>
+                </a:extLst>
+              </p:cNvPr>
+              <p:cNvSpPr txBox="1"/>
+              <p:nvPr/>
+            </p:nvSpPr>
+            <p:spPr>
+              <a:xfrm>
+                <a:off x="3927441" y="5615465"/>
+                <a:ext cx="514650" cy="338554"/>
+              </a:xfrm>
+              <a:prstGeom prst="rect">
+                <a:avLst/>
+              </a:prstGeom>
+              <a:noFill/>
+            </p:spPr>
+            <p:txBody>
+              <a:bodyPr wrap="square" rtlCol="0">
+                <a:spAutoFit/>
+              </a:bodyPr>
+              <a:lstStyle/>
+              <a:p>
+                <a:r>
+                  <a:rPr lang="en-GB" sz="1600" i="1" dirty="0"/>
+                  <a:t>R4</a:t>
+                </a:r>
+              </a:p>
+            </p:txBody>
+          </p:sp>
+          <p:sp>
+            <p:nvSpPr>
+              <p:cNvPr id="31" name="TextBox 30">
+                <a:extLst>
+                  <a:ext uri="{FF2B5EF4-FFF2-40B4-BE49-F238E27FC236}">
+                    <a16:creationId xmlns:a16="http://schemas.microsoft.com/office/drawing/2014/main" id="{CE2045C1-77BB-A748-8C5F-EAB90F771773}"/>
+                  </a:ext>
+                </a:extLst>
+              </p:cNvPr>
+              <p:cNvSpPr txBox="1"/>
+              <p:nvPr/>
+            </p:nvSpPr>
+            <p:spPr>
+              <a:xfrm>
+                <a:off x="8045861" y="1254803"/>
+                <a:ext cx="519406" cy="338554"/>
+              </a:xfrm>
+              <a:prstGeom prst="rect">
+                <a:avLst/>
+              </a:prstGeom>
+              <a:noFill/>
+            </p:spPr>
+            <p:txBody>
+              <a:bodyPr wrap="square" rtlCol="0">
+                <a:spAutoFit/>
+              </a:bodyPr>
+              <a:lstStyle/>
+              <a:p>
+                <a:r>
+                  <a:rPr lang="en-GB" sz="1600" i="1" dirty="0"/>
+                  <a:t>R2</a:t>
+                </a:r>
+              </a:p>
+            </p:txBody>
+          </p:sp>
+          <p:cxnSp>
+            <p:nvCxnSpPr>
+              <p:cNvPr id="32" name="Elbow Connector 31">
+                <a:extLst>
+                  <a:ext uri="{FF2B5EF4-FFF2-40B4-BE49-F238E27FC236}">
+                    <a16:creationId xmlns:a16="http://schemas.microsoft.com/office/drawing/2014/main" id="{F6219123-7605-7545-B6B8-8EE575412933}"/>
+                  </a:ext>
+                </a:extLst>
+              </p:cNvPr>
+              <p:cNvCxnSpPr>
+                <a:cxnSpLocks/>
+                <a:stCxn id="14" idx="2"/>
+                <a:endCxn id="22" idx="0"/>
+              </p:cNvCxnSpPr>
+              <p:nvPr/>
+            </p:nvCxnSpPr>
+            <p:spPr>
+              <a:xfrm rot="5400000">
+                <a:off x="3051236" y="3345452"/>
+                <a:ext cx="2715957" cy="457200"/>
+              </a:xfrm>
+              <a:prstGeom prst="bentConnector3">
+                <a:avLst>
+                  <a:gd name="adj1" fmla="val 50000"/>
+                </a:avLst>
+              </a:prstGeom>
+              <a:ln w="76200">
+                <a:solidFill>
+                  <a:srgbClr val="FF0000"/>
+                </a:solidFill>
+                <a:tailEnd type="triangle"/>
+              </a:ln>
+            </p:spPr>
+            <p:style>
+              <a:lnRef idx="1">
+                <a:schemeClr val="accent1"/>
+              </a:lnRef>
+              <a:fillRef idx="0">
+                <a:schemeClr val="accent1"/>
+              </a:fillRef>
+              <a:effectRef idx="0">
+                <a:schemeClr val="accent1"/>
+              </a:effectRef>
+              <a:fontRef idx="minor">
+                <a:schemeClr val="tx1"/>
+              </a:fontRef>
+            </p:style>
+          </p:cxnSp>
+          <p:sp>
+            <p:nvSpPr>
+              <p:cNvPr id="36" name="TextBox 35">
+                <a:extLst>
+                  <a:ext uri="{FF2B5EF4-FFF2-40B4-BE49-F238E27FC236}">
+                    <a16:creationId xmlns:a16="http://schemas.microsoft.com/office/drawing/2014/main" id="{D24F4AD1-5E45-C647-926C-04A835A10CCB}"/>
+                  </a:ext>
+                </a:extLst>
+              </p:cNvPr>
+              <p:cNvSpPr txBox="1"/>
+              <p:nvPr/>
+            </p:nvSpPr>
+            <p:spPr>
+              <a:xfrm>
+                <a:off x="6097108" y="1589646"/>
+                <a:ext cx="631129" cy="338554"/>
+              </a:xfrm>
+              <a:prstGeom prst="rect">
+                <a:avLst/>
+              </a:prstGeom>
+              <a:noFill/>
+            </p:spPr>
+            <p:txBody>
+              <a:bodyPr wrap="square" rtlCol="0">
+                <a:spAutoFit/>
+              </a:bodyPr>
+              <a:lstStyle/>
+              <a:p>
+                <a:r>
+                  <a:rPr lang="en-GB" sz="1600" i="1" dirty="0"/>
+                  <a:t>Fork</a:t>
+                </a:r>
+                <a:endParaRPr lang="en-GB" i="1" dirty="0"/>
+              </a:p>
+            </p:txBody>
+          </p:sp>
+          <p:sp>
+            <p:nvSpPr>
+              <p:cNvPr id="37" name="TextBox 36">
+                <a:extLst>
+                  <a:ext uri="{FF2B5EF4-FFF2-40B4-BE49-F238E27FC236}">
+                    <a16:creationId xmlns:a16="http://schemas.microsoft.com/office/drawing/2014/main" id="{7F825E6B-BE6C-8C41-B822-BDDC11D0858A}"/>
+                  </a:ext>
+                </a:extLst>
+              </p:cNvPr>
+              <p:cNvSpPr txBox="1"/>
+              <p:nvPr/>
+            </p:nvSpPr>
+            <p:spPr>
+              <a:xfrm>
+                <a:off x="4323246" y="4120702"/>
+                <a:ext cx="914400" cy="338554"/>
+              </a:xfrm>
+              <a:prstGeom prst="rect">
+                <a:avLst/>
+              </a:prstGeom>
+              <a:noFill/>
+            </p:spPr>
+            <p:txBody>
+              <a:bodyPr wrap="square" rtlCol="0">
+                <a:spAutoFit/>
+              </a:bodyPr>
+              <a:lstStyle/>
+              <a:p>
+                <a:r>
+                  <a:rPr lang="en-GB" sz="1600" i="1" dirty="0"/>
+                  <a:t>Clone</a:t>
+                </a:r>
+                <a:endParaRPr lang="en-GB" i="1" dirty="0"/>
+              </a:p>
+            </p:txBody>
+          </p:sp>
+          <p:sp>
+            <p:nvSpPr>
+              <p:cNvPr id="38" name="Rectangle 37">
+                <a:extLst>
+                  <a:ext uri="{FF2B5EF4-FFF2-40B4-BE49-F238E27FC236}">
+                    <a16:creationId xmlns:a16="http://schemas.microsoft.com/office/drawing/2014/main" id="{E749EDAB-BD38-404F-9ABD-BF00C9C47E5C}"/>
+                  </a:ext>
+                </a:extLst>
+              </p:cNvPr>
+              <p:cNvSpPr/>
+              <p:nvPr/>
+            </p:nvSpPr>
+            <p:spPr>
+              <a:xfrm>
+                <a:off x="2239458" y="347241"/>
+                <a:ext cx="8293504" cy="3081759"/>
+              </a:xfrm>
+              <a:prstGeom prst="rect">
+                <a:avLst/>
+              </a:prstGeom>
+              <a:noFill/>
+              <a:ln>
+                <a:solidFill>
+                  <a:schemeClr val="tx1"/>
+                </a:solidFill>
+                <a:prstDash val="sysDash"/>
+              </a:ln>
+            </p:spPr>
+            <p:style>
+              <a:lnRef idx="2">
+                <a:schemeClr val="accent1">
+                  <a:shade val="50000"/>
+                </a:schemeClr>
+              </a:lnRef>
+              <a:fillRef idx="1">
+                <a:schemeClr val="accent1"/>
+              </a:fillRef>
+              <a:effectRef idx="0">
+                <a:schemeClr val="accent1"/>
+              </a:effectRef>
+              <a:fontRef idx="minor">
+                <a:schemeClr val="lt1"/>
+              </a:fontRef>
+            </p:style>
+            <p:txBody>
+              <a:bodyPr rtlCol="0" anchor="ctr"/>
+              <a:lstStyle/>
+              <a:p>
+                <a:pPr algn="ctr"/>
+                <a:endParaRPr lang="en-GB"/>
+              </a:p>
+            </p:txBody>
+          </p:sp>
+          <p:sp>
+            <p:nvSpPr>
+              <p:cNvPr id="39" name="TextBox 38">
+                <a:extLst>
+                  <a:ext uri="{FF2B5EF4-FFF2-40B4-BE49-F238E27FC236}">
+                    <a16:creationId xmlns:a16="http://schemas.microsoft.com/office/drawing/2014/main" id="{DC9C1064-EC90-4C49-A932-7D968C1362B5}"/>
+                  </a:ext>
+                </a:extLst>
+              </p:cNvPr>
+              <p:cNvSpPr txBox="1"/>
+              <p:nvPr/>
+            </p:nvSpPr>
+            <p:spPr>
+              <a:xfrm>
+                <a:off x="3649135" y="6466282"/>
+                <a:ext cx="2805753" cy="338554"/>
+              </a:xfrm>
+              <a:prstGeom prst="rect">
+                <a:avLst/>
+              </a:prstGeom>
+              <a:noFill/>
+            </p:spPr>
+            <p:txBody>
+              <a:bodyPr wrap="square" rtlCol="0">
+                <a:spAutoFit/>
+              </a:bodyPr>
+              <a:lstStyle/>
+              <a:p>
+                <a:r>
+                  <a:rPr lang="en-GB" sz="1600" i="1" dirty="0"/>
+                  <a:t>Your own system</a:t>
+                </a:r>
+              </a:p>
+            </p:txBody>
+          </p:sp>
+          <p:sp>
+            <p:nvSpPr>
+              <p:cNvPr id="40" name="Rounded Rectangle 39">
+                <a:extLst>
+                  <a:ext uri="{FF2B5EF4-FFF2-40B4-BE49-F238E27FC236}">
+                    <a16:creationId xmlns:a16="http://schemas.microsoft.com/office/drawing/2014/main" id="{EB0D579D-250D-CD4A-A5BB-D519FCA96F43}"/>
+                  </a:ext>
+                </a:extLst>
+              </p:cNvPr>
+              <p:cNvSpPr/>
+              <p:nvPr/>
+            </p:nvSpPr>
+            <p:spPr>
+              <a:xfrm>
+                <a:off x="2257053" y="4788162"/>
+                <a:ext cx="914400" cy="914400"/>
+              </a:xfrm>
+              <a:prstGeom prst="roundRect">
+                <a:avLst/>
+              </a:prstGeom>
+            </p:spPr>
+            <p:style>
+              <a:lnRef idx="2">
+                <a:schemeClr val="accent1">
+                  <a:shade val="50000"/>
+                </a:schemeClr>
+              </a:lnRef>
+              <a:fillRef idx="1">
+                <a:schemeClr val="accent1"/>
+              </a:fillRef>
+              <a:effectRef idx="0">
+                <a:schemeClr val="accent1"/>
+              </a:effectRef>
+              <a:fontRef idx="minor">
+                <a:schemeClr val="lt1"/>
+              </a:fontRef>
+            </p:style>
+            <p:txBody>
+              <a:bodyPr rtlCol="0" anchor="ctr"/>
+              <a:lstStyle/>
+              <a:p>
+                <a:pPr algn="ctr"/>
+                <a:r>
+                  <a:rPr lang="en-GB" dirty="0"/>
+                  <a:t>Git Repo</a:t>
+                </a:r>
+              </a:p>
+            </p:txBody>
+          </p:sp>
+          <p:cxnSp>
+            <p:nvCxnSpPr>
+              <p:cNvPr id="42" name="Straight Arrow Connector 41">
+                <a:extLst>
+                  <a:ext uri="{FF2B5EF4-FFF2-40B4-BE49-F238E27FC236}">
+                    <a16:creationId xmlns:a16="http://schemas.microsoft.com/office/drawing/2014/main" id="{38407856-3E50-474E-92F8-CA4A9E533509}"/>
+                  </a:ext>
+                </a:extLst>
+              </p:cNvPr>
+              <p:cNvCxnSpPr>
+                <a:cxnSpLocks/>
+                <a:stCxn id="7" idx="2"/>
+                <a:endCxn id="22" idx="3"/>
+              </p:cNvCxnSpPr>
+              <p:nvPr/>
+            </p:nvCxnSpPr>
+            <p:spPr>
+              <a:xfrm flipH="1">
+                <a:off x="4637814" y="2216073"/>
+                <a:ext cx="3592742" cy="3029290"/>
+              </a:xfrm>
+              <a:prstGeom prst="straightConnector1">
+                <a:avLst/>
+              </a:prstGeom>
+              <a:ln>
+                <a:prstDash val="dash"/>
+                <a:tailEnd type="triangle"/>
+              </a:ln>
+            </p:spPr>
+            <p:style>
+              <a:lnRef idx="1">
+                <a:schemeClr val="accent1"/>
+              </a:lnRef>
+              <a:fillRef idx="0">
+                <a:schemeClr val="accent1"/>
+              </a:fillRef>
+              <a:effectRef idx="0">
+                <a:schemeClr val="accent1"/>
+              </a:effectRef>
+              <a:fontRef idx="minor">
+                <a:schemeClr val="tx1"/>
+              </a:fontRef>
+            </p:style>
+          </p:cxnSp>
+          <p:cxnSp>
+            <p:nvCxnSpPr>
+              <p:cNvPr id="45" name="Straight Connector 44">
+                <a:extLst>
+                  <a:ext uri="{FF2B5EF4-FFF2-40B4-BE49-F238E27FC236}">
+                    <a16:creationId xmlns:a16="http://schemas.microsoft.com/office/drawing/2014/main" id="{BAEA017C-9C86-4943-BA2A-3CBB6D6F63EB}"/>
+                  </a:ext>
+                </a:extLst>
+              </p:cNvPr>
+              <p:cNvCxnSpPr>
+                <a:stCxn id="5" idx="2"/>
+                <a:endCxn id="40" idx="0"/>
+              </p:cNvCxnSpPr>
+              <p:nvPr/>
+            </p:nvCxnSpPr>
+            <p:spPr>
+              <a:xfrm flipH="1">
+                <a:off x="2714253" y="2216075"/>
+                <a:ext cx="582193" cy="2572087"/>
+              </a:xfrm>
+              <a:prstGeom prst="line">
+                <a:avLst/>
+              </a:prstGeom>
+              <a:ln>
+                <a:solidFill>
+                  <a:schemeClr val="tx1"/>
+                </a:solidFill>
+                <a:prstDash val="sysDot"/>
+              </a:ln>
+            </p:spPr>
+            <p:style>
+              <a:lnRef idx="1">
+                <a:schemeClr val="accent1"/>
+              </a:lnRef>
+              <a:fillRef idx="0">
+                <a:schemeClr val="accent1"/>
+              </a:fillRef>
+              <a:effectRef idx="0">
+                <a:schemeClr val="accent1"/>
+              </a:effectRef>
+              <a:fontRef idx="minor">
+                <a:schemeClr val="tx1"/>
+              </a:fontRef>
+            </p:style>
+          </p:cxnSp>
+          <p:sp>
+            <p:nvSpPr>
+              <p:cNvPr id="47" name="TextBox 46">
+                <a:extLst>
+                  <a:ext uri="{FF2B5EF4-FFF2-40B4-BE49-F238E27FC236}">
+                    <a16:creationId xmlns:a16="http://schemas.microsoft.com/office/drawing/2014/main" id="{47621E87-A9D7-2B4D-B90A-429BF427C6AE}"/>
+                  </a:ext>
+                </a:extLst>
+              </p:cNvPr>
+              <p:cNvSpPr txBox="1"/>
+              <p:nvPr/>
+            </p:nvSpPr>
+            <p:spPr>
+              <a:xfrm>
+                <a:off x="6225915" y="327403"/>
+                <a:ext cx="4307047" cy="338554"/>
+              </a:xfrm>
+              <a:prstGeom prst="rect">
+                <a:avLst/>
+              </a:prstGeom>
+              <a:noFill/>
+            </p:spPr>
+            <p:txBody>
+              <a:bodyPr wrap="square" rtlCol="0">
+                <a:spAutoFit/>
+              </a:bodyPr>
+              <a:lstStyle/>
+              <a:p>
+                <a:r>
+                  <a:rPr lang="en-GB" sz="1600" i="1" dirty="0"/>
+                  <a:t>Your Collaborator’s External Git Repositories</a:t>
+                </a:r>
+              </a:p>
+            </p:txBody>
+          </p:sp>
+          <p:sp>
+            <p:nvSpPr>
+              <p:cNvPr id="49" name="TextBox 48">
+                <a:extLst>
+                  <a:ext uri="{FF2B5EF4-FFF2-40B4-BE49-F238E27FC236}">
+                    <a16:creationId xmlns:a16="http://schemas.microsoft.com/office/drawing/2014/main" id="{AF74113E-2C1C-4542-8982-DAB29EA3B265}"/>
+                  </a:ext>
+                </a:extLst>
+              </p:cNvPr>
+              <p:cNvSpPr txBox="1"/>
+              <p:nvPr/>
+            </p:nvSpPr>
+            <p:spPr>
+              <a:xfrm>
+                <a:off x="2666532" y="327403"/>
+                <a:ext cx="3028164" cy="338554"/>
+              </a:xfrm>
+              <a:prstGeom prst="rect">
+                <a:avLst/>
+              </a:prstGeom>
+              <a:noFill/>
+            </p:spPr>
+            <p:txBody>
+              <a:bodyPr wrap="square" rtlCol="0">
+                <a:spAutoFit/>
+              </a:bodyPr>
+              <a:lstStyle/>
+              <a:p>
+                <a:r>
+                  <a:rPr lang="en-GB" sz="1600" i="1" dirty="0"/>
+                  <a:t>Your External Git Repositories</a:t>
+                </a:r>
+              </a:p>
+            </p:txBody>
+          </p:sp>
         </p:grpSp>
         <p:sp>
           <p:nvSpPr>
-            <p:cNvPr id="14" name="Rounded Rectangle 13">
+            <p:cNvPr id="33" name="TextBox 32">
               <a:extLst>
                 <a:ext uri="{FF2B5EF4-FFF2-40B4-BE49-F238E27FC236}">
-                  <a16:creationId xmlns:a16="http://schemas.microsoft.com/office/drawing/2014/main" id="{BC01A2CE-04EA-4A41-95BA-CD72B5443E98}"/>
-                </a:ext>
-              </a:extLst>
-            </p:cNvPr>
-            <p:cNvSpPr/>
-            <p:nvPr/>
-          </p:nvSpPr>
-          <p:spPr>
-            <a:xfrm>
-              <a:off x="4180614" y="1589411"/>
-              <a:ext cx="914400" cy="626663"/>
-            </a:xfrm>
-            <a:prstGeom prst="roundRect">
-              <a:avLst/>
-            </a:prstGeom>
-            <a:solidFill>
-              <a:srgbClr val="00B050"/>
-            </a:solidFill>
-          </p:spPr>
-          <p:style>
-            <a:lnRef idx="2">
-              <a:schemeClr val="accent1">
-                <a:shade val="50000"/>
-              </a:schemeClr>
-            </a:lnRef>
-            <a:fillRef idx="1">
-              <a:schemeClr val="accent1"/>
-            </a:fillRef>
-            <a:effectRef idx="0">
-              <a:schemeClr val="accent1"/>
-            </a:effectRef>
-            <a:fontRef idx="minor">
-              <a:schemeClr val="lt1"/>
-            </a:fontRef>
-          </p:style>
-          <p:txBody>
-            <a:bodyPr rtlCol="0" anchor="ctr"/>
-            <a:lstStyle/>
-            <a:p>
-              <a:pPr algn="ctr"/>
-              <a:r>
-                <a:rPr lang="en-GB" dirty="0"/>
-                <a:t>Git Repo</a:t>
-              </a:r>
-            </a:p>
-          </p:txBody>
-        </p:sp>
-        <p:pic>
-          <p:nvPicPr>
-            <p:cNvPr id="16" name="Picture 15">
-              <a:extLst>
-                <a:ext uri="{FF2B5EF4-FFF2-40B4-BE49-F238E27FC236}">
-                  <a16:creationId xmlns:a16="http://schemas.microsoft.com/office/drawing/2014/main" id="{87B1F67C-8B6B-4947-9736-E23954A1F28B}"/>
-                </a:ext>
-              </a:extLst>
-            </p:cNvPr>
-            <p:cNvPicPr>
-              <a:picLocks noChangeAspect="1"/>
-            </p:cNvPicPr>
-            <p:nvPr/>
-          </p:nvPicPr>
-          <p:blipFill>
-            <a:blip r:embed="rId2"/>
-            <a:stretch>
-              <a:fillRect/>
-            </a:stretch>
-          </p:blipFill>
-          <p:spPr>
-            <a:xfrm>
-              <a:off x="834575" y="4792079"/>
-              <a:ext cx="998372" cy="1080000"/>
-            </a:xfrm>
-            <a:prstGeom prst="rect">
-              <a:avLst/>
-            </a:prstGeom>
-          </p:spPr>
-        </p:pic>
-        <p:sp>
-          <p:nvSpPr>
-            <p:cNvPr id="18" name="Rectangle 17">
-              <a:extLst>
-                <a:ext uri="{FF2B5EF4-FFF2-40B4-BE49-F238E27FC236}">
-                  <a16:creationId xmlns:a16="http://schemas.microsoft.com/office/drawing/2014/main" id="{4938C13F-9874-C94D-9442-7031189DA2E9}"/>
-                </a:ext>
-              </a:extLst>
-            </p:cNvPr>
-            <p:cNvSpPr/>
-            <p:nvPr/>
-          </p:nvSpPr>
-          <p:spPr>
-            <a:xfrm>
-              <a:off x="600075" y="3886200"/>
-              <a:ext cx="4793728" cy="2571750"/>
-            </a:xfrm>
-            <a:prstGeom prst="rect">
-              <a:avLst/>
-            </a:prstGeom>
-            <a:noFill/>
-            <a:ln>
-              <a:prstDash val="lgDash"/>
-            </a:ln>
-          </p:spPr>
-          <p:style>
-            <a:lnRef idx="2">
-              <a:schemeClr val="accent1">
-                <a:shade val="50000"/>
-              </a:schemeClr>
-            </a:lnRef>
-            <a:fillRef idx="1">
-              <a:schemeClr val="accent1"/>
-            </a:fillRef>
-            <a:effectRef idx="0">
-              <a:schemeClr val="accent1"/>
-            </a:effectRef>
-            <a:fontRef idx="minor">
-              <a:schemeClr val="lt1"/>
-            </a:fontRef>
-          </p:style>
-          <p:txBody>
-            <a:bodyPr rtlCol="0" anchor="ctr"/>
-            <a:lstStyle/>
-            <a:p>
-              <a:pPr algn="ctr"/>
-              <a:endParaRPr lang="en-GB"/>
-            </a:p>
-          </p:txBody>
-        </p:sp>
-        <p:sp>
-          <p:nvSpPr>
-            <p:cNvPr id="22" name="Rounded Rectangle 21">
-              <a:extLst>
-                <a:ext uri="{FF2B5EF4-FFF2-40B4-BE49-F238E27FC236}">
-                  <a16:creationId xmlns:a16="http://schemas.microsoft.com/office/drawing/2014/main" id="{13281585-0573-C44C-835E-0AFAAC4F1A40}"/>
-                </a:ext>
-              </a:extLst>
-            </p:cNvPr>
-            <p:cNvSpPr/>
-            <p:nvPr/>
-          </p:nvSpPr>
-          <p:spPr>
-            <a:xfrm>
-              <a:off x="3723414" y="4932031"/>
-              <a:ext cx="914400" cy="626663"/>
-            </a:xfrm>
-            <a:prstGeom prst="roundRect">
-              <a:avLst/>
-            </a:prstGeom>
-            <a:solidFill>
-              <a:srgbClr val="00B050"/>
-            </a:solidFill>
-          </p:spPr>
-          <p:style>
-            <a:lnRef idx="2">
-              <a:schemeClr val="accent1">
-                <a:shade val="50000"/>
-              </a:schemeClr>
-            </a:lnRef>
-            <a:fillRef idx="1">
-              <a:schemeClr val="accent1"/>
-            </a:fillRef>
-            <a:effectRef idx="0">
-              <a:schemeClr val="accent1"/>
-            </a:effectRef>
-            <a:fontRef idx="minor">
-              <a:schemeClr val="lt1"/>
-            </a:fontRef>
-          </p:style>
-          <p:txBody>
-            <a:bodyPr rtlCol="0" anchor="ctr"/>
-            <a:lstStyle/>
-            <a:p>
-              <a:pPr algn="ctr"/>
-              <a:r>
-                <a:rPr lang="en-GB" dirty="0"/>
-                <a:t>Git Repo</a:t>
-              </a:r>
-            </a:p>
-          </p:txBody>
-        </p:sp>
-        <p:cxnSp>
-          <p:nvCxnSpPr>
-            <p:cNvPr id="23" name="Elbow Connector 22">
-              <a:extLst>
-                <a:ext uri="{FF2B5EF4-FFF2-40B4-BE49-F238E27FC236}">
-                  <a16:creationId xmlns:a16="http://schemas.microsoft.com/office/drawing/2014/main" id="{36915D43-6F01-5B4F-A0B8-8F8895721E49}"/>
-                </a:ext>
-              </a:extLst>
-            </p:cNvPr>
-            <p:cNvCxnSpPr>
-              <a:cxnSpLocks/>
-            </p:cNvCxnSpPr>
-            <p:nvPr/>
-          </p:nvCxnSpPr>
-          <p:spPr>
-            <a:xfrm rot="10800000" flipV="1">
-              <a:off x="5095014" y="1902741"/>
-              <a:ext cx="2678342" cy="1"/>
-            </a:xfrm>
-            <a:prstGeom prst="bentConnector3">
-              <a:avLst>
-                <a:gd name="adj1" fmla="val 50000"/>
-              </a:avLst>
-            </a:prstGeom>
-            <a:ln w="76200">
-              <a:solidFill>
-                <a:srgbClr val="FF0000"/>
-              </a:solidFill>
-              <a:tailEnd type="triangle"/>
-            </a:ln>
-          </p:spPr>
-          <p:style>
-            <a:lnRef idx="1">
-              <a:schemeClr val="accent1"/>
-            </a:lnRef>
-            <a:fillRef idx="0">
-              <a:schemeClr val="accent1"/>
-            </a:fillRef>
-            <a:effectRef idx="0">
-              <a:schemeClr val="accent1"/>
-            </a:effectRef>
-            <a:fontRef idx="minor">
-              <a:schemeClr val="tx1"/>
-            </a:fontRef>
-          </p:style>
-        </p:cxnSp>
-        <p:sp>
-          <p:nvSpPr>
-            <p:cNvPr id="24" name="TextBox 23">
-              <a:extLst>
-                <a:ext uri="{FF2B5EF4-FFF2-40B4-BE49-F238E27FC236}">
-                  <a16:creationId xmlns:a16="http://schemas.microsoft.com/office/drawing/2014/main" id="{7CECE6BB-3BE6-194A-9371-7DD1730FFDAE}"/>
+                  <a16:creationId xmlns:a16="http://schemas.microsoft.com/office/drawing/2014/main" id="{FBCCA351-8C2B-0649-B5E2-BD217F3E652F}"/>
                 </a:ext>
               </a:extLst>
             </p:cNvPr>
@@ -13172,8 +13786,8 @@
           </p:nvSpPr>
           <p:spPr>
             <a:xfrm>
-              <a:off x="7773356" y="3462222"/>
-              <a:ext cx="2805753" cy="369332"/>
+              <a:off x="6229339" y="3803358"/>
+              <a:ext cx="1105017" cy="307777"/>
             </a:xfrm>
             <a:prstGeom prst="rect">
               <a:avLst/>
@@ -13187,563 +13801,10 @@
             <a:lstStyle/>
             <a:p>
               <a:r>
-                <a:rPr lang="en-GB" i="1" dirty="0"/>
-                <a:t>External Git Service Provider</a:t>
+                <a:rPr lang="en-GB" sz="1400" i="1" dirty="0"/>
+                <a:t>upstream</a:t>
               </a:r>
-            </a:p>
-          </p:txBody>
-        </p:sp>
-        <p:sp>
-          <p:nvSpPr>
-            <p:cNvPr id="27" name="TextBox 26">
-              <a:extLst>
-                <a:ext uri="{FF2B5EF4-FFF2-40B4-BE49-F238E27FC236}">
-                  <a16:creationId xmlns:a16="http://schemas.microsoft.com/office/drawing/2014/main" id="{3F382545-97DB-4D46-A3BE-B4D7CEBB0DF9}"/>
-                </a:ext>
-              </a:extLst>
-            </p:cNvPr>
-            <p:cNvSpPr txBox="1"/>
-            <p:nvPr/>
-          </p:nvSpPr>
-          <p:spPr>
-            <a:xfrm>
-              <a:off x="3063123" y="1289818"/>
-              <a:ext cx="427440" cy="369332"/>
-            </a:xfrm>
-            <a:prstGeom prst="rect">
-              <a:avLst/>
-            </a:prstGeom>
-            <a:noFill/>
-          </p:spPr>
-          <p:txBody>
-            <a:bodyPr wrap="square" rtlCol="0">
-              <a:spAutoFit/>
-            </a:bodyPr>
-            <a:lstStyle/>
-            <a:p>
-              <a:r>
-                <a:rPr lang="en-GB" i="1" dirty="0"/>
-                <a:t>R1</a:t>
-              </a:r>
-            </a:p>
-          </p:txBody>
-        </p:sp>
-        <p:sp>
-          <p:nvSpPr>
-            <p:cNvPr id="29" name="TextBox 28">
-              <a:extLst>
-                <a:ext uri="{FF2B5EF4-FFF2-40B4-BE49-F238E27FC236}">
-                  <a16:creationId xmlns:a16="http://schemas.microsoft.com/office/drawing/2014/main" id="{DFFCD99B-D7FE-7A47-B089-C5BD3BC579A1}"/>
-                </a:ext>
-              </a:extLst>
-            </p:cNvPr>
-            <p:cNvSpPr txBox="1"/>
-            <p:nvPr/>
-          </p:nvSpPr>
-          <p:spPr>
-            <a:xfrm>
-              <a:off x="4442091" y="1252580"/>
-              <a:ext cx="427440" cy="369332"/>
-            </a:xfrm>
-            <a:prstGeom prst="rect">
-              <a:avLst/>
-            </a:prstGeom>
-            <a:noFill/>
-          </p:spPr>
-          <p:txBody>
-            <a:bodyPr wrap="square" rtlCol="0">
-              <a:spAutoFit/>
-            </a:bodyPr>
-            <a:lstStyle/>
-            <a:p>
-              <a:r>
-                <a:rPr lang="en-GB" i="1" dirty="0"/>
-                <a:t>R3</a:t>
-              </a:r>
-            </a:p>
-          </p:txBody>
-        </p:sp>
-        <p:sp>
-          <p:nvSpPr>
-            <p:cNvPr id="30" name="TextBox 29">
-              <a:extLst>
-                <a:ext uri="{FF2B5EF4-FFF2-40B4-BE49-F238E27FC236}">
-                  <a16:creationId xmlns:a16="http://schemas.microsoft.com/office/drawing/2014/main" id="{DCC3A6B8-69C4-9546-ACC1-71EBA60DF0F1}"/>
-                </a:ext>
-              </a:extLst>
-            </p:cNvPr>
-            <p:cNvSpPr txBox="1"/>
-            <p:nvPr/>
-          </p:nvSpPr>
-          <p:spPr>
-            <a:xfrm>
-              <a:off x="3927441" y="5661765"/>
-              <a:ext cx="427440" cy="369332"/>
-            </a:xfrm>
-            <a:prstGeom prst="rect">
-              <a:avLst/>
-            </a:prstGeom>
-            <a:noFill/>
-          </p:spPr>
-          <p:txBody>
-            <a:bodyPr wrap="square" rtlCol="0">
-              <a:spAutoFit/>
-            </a:bodyPr>
-            <a:lstStyle/>
-            <a:p>
-              <a:r>
-                <a:rPr lang="en-GB" i="1" dirty="0"/>
-                <a:t>R4</a:t>
-              </a:r>
-            </a:p>
-          </p:txBody>
-        </p:sp>
-        <p:sp>
-          <p:nvSpPr>
-            <p:cNvPr id="31" name="TextBox 30">
-              <a:extLst>
-                <a:ext uri="{FF2B5EF4-FFF2-40B4-BE49-F238E27FC236}">
-                  <a16:creationId xmlns:a16="http://schemas.microsoft.com/office/drawing/2014/main" id="{CE2045C1-77BB-A748-8C5F-EAB90F771773}"/>
-                </a:ext>
-              </a:extLst>
-            </p:cNvPr>
-            <p:cNvSpPr txBox="1"/>
-            <p:nvPr/>
-          </p:nvSpPr>
-          <p:spPr>
-            <a:xfrm>
-              <a:off x="7987986" y="1220078"/>
-              <a:ext cx="427440" cy="369332"/>
-            </a:xfrm>
-            <a:prstGeom prst="rect">
-              <a:avLst/>
-            </a:prstGeom>
-            <a:noFill/>
-          </p:spPr>
-          <p:txBody>
-            <a:bodyPr wrap="square" rtlCol="0">
-              <a:spAutoFit/>
-            </a:bodyPr>
-            <a:lstStyle/>
-            <a:p>
-              <a:r>
-                <a:rPr lang="en-GB" i="1" dirty="0"/>
-                <a:t>R2</a:t>
-              </a:r>
-            </a:p>
-          </p:txBody>
-        </p:sp>
-        <p:cxnSp>
-          <p:nvCxnSpPr>
-            <p:cNvPr id="32" name="Elbow Connector 31">
-              <a:extLst>
-                <a:ext uri="{FF2B5EF4-FFF2-40B4-BE49-F238E27FC236}">
-                  <a16:creationId xmlns:a16="http://schemas.microsoft.com/office/drawing/2014/main" id="{F6219123-7605-7545-B6B8-8EE575412933}"/>
-                </a:ext>
-              </a:extLst>
-            </p:cNvPr>
-            <p:cNvCxnSpPr>
-              <a:cxnSpLocks/>
-              <a:stCxn id="14" idx="2"/>
-              <a:endCxn id="22" idx="0"/>
-            </p:cNvCxnSpPr>
-            <p:nvPr/>
-          </p:nvCxnSpPr>
-          <p:spPr>
-            <a:xfrm rot="5400000">
-              <a:off x="3051236" y="3345452"/>
-              <a:ext cx="2715957" cy="457200"/>
-            </a:xfrm>
-            <a:prstGeom prst="bentConnector3">
-              <a:avLst>
-                <a:gd name="adj1" fmla="val 50000"/>
-              </a:avLst>
-            </a:prstGeom>
-            <a:ln w="76200">
-              <a:solidFill>
-                <a:srgbClr val="FF0000"/>
-              </a:solidFill>
-              <a:tailEnd type="triangle"/>
-            </a:ln>
-          </p:spPr>
-          <p:style>
-            <a:lnRef idx="1">
-              <a:schemeClr val="accent1"/>
-            </a:lnRef>
-            <a:fillRef idx="0">
-              <a:schemeClr val="accent1"/>
-            </a:fillRef>
-            <a:effectRef idx="0">
-              <a:schemeClr val="accent1"/>
-            </a:effectRef>
-            <a:fontRef idx="minor">
-              <a:schemeClr val="tx1"/>
-            </a:fontRef>
-          </p:style>
-        </p:cxnSp>
-        <p:sp>
-          <p:nvSpPr>
-            <p:cNvPr id="36" name="TextBox 35">
-              <a:extLst>
-                <a:ext uri="{FF2B5EF4-FFF2-40B4-BE49-F238E27FC236}">
-                  <a16:creationId xmlns:a16="http://schemas.microsoft.com/office/drawing/2014/main" id="{D24F4AD1-5E45-C647-926C-04A835A10CCB}"/>
-                </a:ext>
-              </a:extLst>
-            </p:cNvPr>
-            <p:cNvSpPr txBox="1"/>
-            <p:nvPr/>
-          </p:nvSpPr>
-          <p:spPr>
-            <a:xfrm>
-              <a:off x="6097109" y="1589646"/>
-              <a:ext cx="588366" cy="369332"/>
-            </a:xfrm>
-            <a:prstGeom prst="rect">
-              <a:avLst/>
-            </a:prstGeom>
-            <a:noFill/>
-          </p:spPr>
-          <p:txBody>
-            <a:bodyPr wrap="square" rtlCol="0">
-              <a:spAutoFit/>
-            </a:bodyPr>
-            <a:lstStyle/>
-            <a:p>
-              <a:r>
-                <a:rPr lang="en-GB" i="1" dirty="0"/>
-                <a:t>Fork</a:t>
-              </a:r>
-            </a:p>
-          </p:txBody>
-        </p:sp>
-        <p:sp>
-          <p:nvSpPr>
-            <p:cNvPr id="37" name="TextBox 36">
-              <a:extLst>
-                <a:ext uri="{FF2B5EF4-FFF2-40B4-BE49-F238E27FC236}">
-                  <a16:creationId xmlns:a16="http://schemas.microsoft.com/office/drawing/2014/main" id="{7F825E6B-BE6C-8C41-B822-BDDC11D0858A}"/>
-                </a:ext>
-              </a:extLst>
-            </p:cNvPr>
-            <p:cNvSpPr txBox="1"/>
-            <p:nvPr/>
-          </p:nvSpPr>
-          <p:spPr>
-            <a:xfrm>
-              <a:off x="4323246" y="4120702"/>
-              <a:ext cx="914400" cy="369332"/>
-            </a:xfrm>
-            <a:prstGeom prst="rect">
-              <a:avLst/>
-            </a:prstGeom>
-            <a:noFill/>
-          </p:spPr>
-          <p:txBody>
-            <a:bodyPr wrap="square" rtlCol="0">
-              <a:spAutoFit/>
-            </a:bodyPr>
-            <a:lstStyle/>
-            <a:p>
-              <a:r>
-                <a:rPr lang="en-GB" i="1" dirty="0"/>
-                <a:t>Clone</a:t>
-              </a:r>
-            </a:p>
-          </p:txBody>
-        </p:sp>
-        <p:sp>
-          <p:nvSpPr>
-            <p:cNvPr id="38" name="Rectangle 37">
-              <a:extLst>
-                <a:ext uri="{FF2B5EF4-FFF2-40B4-BE49-F238E27FC236}">
-                  <a16:creationId xmlns:a16="http://schemas.microsoft.com/office/drawing/2014/main" id="{E749EDAB-BD38-404F-9ABD-BF00C9C47E5C}"/>
-                </a:ext>
-              </a:extLst>
-            </p:cNvPr>
-            <p:cNvSpPr/>
-            <p:nvPr/>
-          </p:nvSpPr>
-          <p:spPr>
-            <a:xfrm>
-              <a:off x="2239458" y="347241"/>
-              <a:ext cx="8293504" cy="3081759"/>
-            </a:xfrm>
-            <a:prstGeom prst="rect">
-              <a:avLst/>
-            </a:prstGeom>
-            <a:noFill/>
-            <a:ln>
-              <a:solidFill>
-                <a:schemeClr val="tx1"/>
-              </a:solidFill>
-              <a:prstDash val="sysDash"/>
-            </a:ln>
-          </p:spPr>
-          <p:style>
-            <a:lnRef idx="2">
-              <a:schemeClr val="accent1">
-                <a:shade val="50000"/>
-              </a:schemeClr>
-            </a:lnRef>
-            <a:fillRef idx="1">
-              <a:schemeClr val="accent1"/>
-            </a:fillRef>
-            <a:effectRef idx="0">
-              <a:schemeClr val="accent1"/>
-            </a:effectRef>
-            <a:fontRef idx="minor">
-              <a:schemeClr val="lt1"/>
-            </a:fontRef>
-          </p:style>
-          <p:txBody>
-            <a:bodyPr rtlCol="0" anchor="ctr"/>
-            <a:lstStyle/>
-            <a:p>
-              <a:pPr algn="ctr"/>
-              <a:endParaRPr lang="en-GB"/>
-            </a:p>
-          </p:txBody>
-        </p:sp>
-        <p:sp>
-          <p:nvSpPr>
-            <p:cNvPr id="39" name="TextBox 38">
-              <a:extLst>
-                <a:ext uri="{FF2B5EF4-FFF2-40B4-BE49-F238E27FC236}">
-                  <a16:creationId xmlns:a16="http://schemas.microsoft.com/office/drawing/2014/main" id="{DC9C1064-EC90-4C49-A932-7D968C1362B5}"/>
-                </a:ext>
-              </a:extLst>
-            </p:cNvPr>
-            <p:cNvSpPr txBox="1"/>
-            <p:nvPr/>
-          </p:nvSpPr>
-          <p:spPr>
-            <a:xfrm>
-              <a:off x="3649135" y="6466282"/>
-              <a:ext cx="2805753" cy="369332"/>
-            </a:xfrm>
-            <a:prstGeom prst="rect">
-              <a:avLst/>
-            </a:prstGeom>
-            <a:noFill/>
-          </p:spPr>
-          <p:txBody>
-            <a:bodyPr wrap="square" rtlCol="0">
-              <a:spAutoFit/>
-            </a:bodyPr>
-            <a:lstStyle/>
-            <a:p>
-              <a:r>
-                <a:rPr lang="en-GB" i="1" dirty="0"/>
-                <a:t>Your own system</a:t>
-              </a:r>
-            </a:p>
-          </p:txBody>
-        </p:sp>
-        <p:sp>
-          <p:nvSpPr>
-            <p:cNvPr id="40" name="Rounded Rectangle 39">
-              <a:extLst>
-                <a:ext uri="{FF2B5EF4-FFF2-40B4-BE49-F238E27FC236}">
-                  <a16:creationId xmlns:a16="http://schemas.microsoft.com/office/drawing/2014/main" id="{EB0D579D-250D-CD4A-A5BB-D519FCA96F43}"/>
-                </a:ext>
-              </a:extLst>
-            </p:cNvPr>
-            <p:cNvSpPr/>
-            <p:nvPr/>
-          </p:nvSpPr>
-          <p:spPr>
-            <a:xfrm>
-              <a:off x="2257053" y="4788162"/>
-              <a:ext cx="914400" cy="914400"/>
-            </a:xfrm>
-            <a:prstGeom prst="roundRect">
-              <a:avLst/>
-            </a:prstGeom>
-          </p:spPr>
-          <p:style>
-            <a:lnRef idx="2">
-              <a:schemeClr val="accent1">
-                <a:shade val="50000"/>
-              </a:schemeClr>
-            </a:lnRef>
-            <a:fillRef idx="1">
-              <a:schemeClr val="accent1"/>
-            </a:fillRef>
-            <a:effectRef idx="0">
-              <a:schemeClr val="accent1"/>
-            </a:effectRef>
-            <a:fontRef idx="minor">
-              <a:schemeClr val="lt1"/>
-            </a:fontRef>
-          </p:style>
-          <p:txBody>
-            <a:bodyPr rtlCol="0" anchor="ctr"/>
-            <a:lstStyle/>
-            <a:p>
-              <a:pPr algn="ctr"/>
-              <a:r>
-                <a:rPr lang="en-GB" dirty="0"/>
-                <a:t>Git Repo</a:t>
-              </a:r>
-            </a:p>
-          </p:txBody>
-        </p:sp>
-        <p:cxnSp>
-          <p:nvCxnSpPr>
-            <p:cNvPr id="42" name="Straight Arrow Connector 41">
-              <a:extLst>
-                <a:ext uri="{FF2B5EF4-FFF2-40B4-BE49-F238E27FC236}">
-                  <a16:creationId xmlns:a16="http://schemas.microsoft.com/office/drawing/2014/main" id="{38407856-3E50-474E-92F8-CA4A9E533509}"/>
-                </a:ext>
-              </a:extLst>
-            </p:cNvPr>
-            <p:cNvCxnSpPr>
-              <a:cxnSpLocks/>
-              <a:stCxn id="7" idx="2"/>
-              <a:endCxn id="22" idx="3"/>
-            </p:cNvCxnSpPr>
-            <p:nvPr/>
-          </p:nvCxnSpPr>
-          <p:spPr>
-            <a:xfrm flipH="1">
-              <a:off x="4637814" y="2216073"/>
-              <a:ext cx="3592742" cy="3029290"/>
-            </a:xfrm>
-            <a:prstGeom prst="straightConnector1">
-              <a:avLst/>
-            </a:prstGeom>
-            <a:ln>
-              <a:prstDash val="dash"/>
-              <a:tailEnd type="triangle"/>
-            </a:ln>
-          </p:spPr>
-          <p:style>
-            <a:lnRef idx="1">
-              <a:schemeClr val="accent1"/>
-            </a:lnRef>
-            <a:fillRef idx="0">
-              <a:schemeClr val="accent1"/>
-            </a:fillRef>
-            <a:effectRef idx="0">
-              <a:schemeClr val="accent1"/>
-            </a:effectRef>
-            <a:fontRef idx="minor">
-              <a:schemeClr val="tx1"/>
-            </a:fontRef>
-          </p:style>
-        </p:cxnSp>
-        <p:cxnSp>
-          <p:nvCxnSpPr>
-            <p:cNvPr id="45" name="Straight Connector 44">
-              <a:extLst>
-                <a:ext uri="{FF2B5EF4-FFF2-40B4-BE49-F238E27FC236}">
-                  <a16:creationId xmlns:a16="http://schemas.microsoft.com/office/drawing/2014/main" id="{BAEA017C-9C86-4943-BA2A-3CBB6D6F63EB}"/>
-                </a:ext>
-              </a:extLst>
-            </p:cNvPr>
-            <p:cNvCxnSpPr>
-              <a:stCxn id="5" idx="2"/>
-              <a:endCxn id="40" idx="0"/>
-            </p:cNvCxnSpPr>
-            <p:nvPr/>
-          </p:nvCxnSpPr>
-          <p:spPr>
-            <a:xfrm flipH="1">
-              <a:off x="2714253" y="2216075"/>
-              <a:ext cx="582193" cy="2572087"/>
-            </a:xfrm>
-            <a:prstGeom prst="line">
-              <a:avLst/>
-            </a:prstGeom>
-            <a:ln>
-              <a:solidFill>
-                <a:schemeClr val="tx1"/>
-              </a:solidFill>
-              <a:prstDash val="sysDot"/>
-            </a:ln>
-          </p:spPr>
-          <p:style>
-            <a:lnRef idx="1">
-              <a:schemeClr val="accent1"/>
-            </a:lnRef>
-            <a:fillRef idx="0">
-              <a:schemeClr val="accent1"/>
-            </a:fillRef>
-            <a:effectRef idx="0">
-              <a:schemeClr val="accent1"/>
-            </a:effectRef>
-            <a:fontRef idx="minor">
-              <a:schemeClr val="tx1"/>
-            </a:fontRef>
-          </p:style>
-        </p:cxnSp>
-        <p:sp>
-          <p:nvSpPr>
-            <p:cNvPr id="47" name="TextBox 46">
-              <a:extLst>
-                <a:ext uri="{FF2B5EF4-FFF2-40B4-BE49-F238E27FC236}">
-                  <a16:creationId xmlns:a16="http://schemas.microsoft.com/office/drawing/2014/main" id="{47621E87-A9D7-2B4D-B90A-429BF427C6AE}"/>
-                </a:ext>
-              </a:extLst>
-            </p:cNvPr>
-            <p:cNvSpPr txBox="1"/>
-            <p:nvPr/>
-          </p:nvSpPr>
-          <p:spPr>
-            <a:xfrm>
-              <a:off x="6225915" y="327403"/>
-              <a:ext cx="4307047" cy="369332"/>
-            </a:xfrm>
-            <a:prstGeom prst="rect">
-              <a:avLst/>
-            </a:prstGeom>
-            <a:noFill/>
-          </p:spPr>
-          <p:txBody>
-            <a:bodyPr wrap="square" rtlCol="0">
-              <a:spAutoFit/>
-            </a:bodyPr>
-            <a:lstStyle/>
-            <a:p>
-              <a:r>
-                <a:rPr lang="en-GB" i="1" dirty="0"/>
-                <a:t>Your Collaborator’s External Git Repositories</a:t>
-              </a:r>
-            </a:p>
-          </p:txBody>
-        </p:sp>
-        <p:sp>
-          <p:nvSpPr>
-            <p:cNvPr id="49" name="TextBox 48">
-              <a:extLst>
-                <a:ext uri="{FF2B5EF4-FFF2-40B4-BE49-F238E27FC236}">
-                  <a16:creationId xmlns:a16="http://schemas.microsoft.com/office/drawing/2014/main" id="{AF74113E-2C1C-4542-8982-DAB29EA3B265}"/>
-                </a:ext>
-              </a:extLst>
-            </p:cNvPr>
-            <p:cNvSpPr txBox="1"/>
-            <p:nvPr/>
-          </p:nvSpPr>
-          <p:spPr>
-            <a:xfrm>
-              <a:off x="2666532" y="327403"/>
-              <a:ext cx="3028164" cy="369332"/>
-            </a:xfrm>
-            <a:prstGeom prst="rect">
-              <a:avLst/>
-            </a:prstGeom>
-            <a:noFill/>
-          </p:spPr>
-          <p:txBody>
-            <a:bodyPr wrap="square" rtlCol="0">
-              <a:spAutoFit/>
-            </a:bodyPr>
-            <a:lstStyle/>
-            <a:p>
-              <a:r>
-                <a:rPr lang="en-GB" i="1" dirty="0"/>
-                <a:t>Your External Git Repositories</a:t>
-              </a:r>
+              <a:endParaRPr lang="en-GB" sz="1600" i="1" dirty="0"/>
             </a:p>
           </p:txBody>
         </p:sp>

</xml_diff>